<commit_message>
Suite après midi du 15 01 2024
</commit_message>
<xml_diff>
--- a/00_notes_de_stage.pptx
+++ b/00_notes_de_stage.pptx
@@ -211,7 +211,7 @@
   <pc:docChgLst>
     <pc:chgData name="Philippe Baucour" userId="5102170ae7533958" providerId="LiveId" clId="{01E73667-2BEF-4007-AD34-DC26F6381063}"/>
     <pc:docChg chg="undo custSel addSld delSld modSld sldOrd">
-      <pc:chgData name="Philippe Baucour" userId="5102170ae7533958" providerId="LiveId" clId="{01E73667-2BEF-4007-AD34-DC26F6381063}" dt="2024-01-15T11:00:02.779" v="24686"/>
+      <pc:chgData name="Philippe Baucour" userId="5102170ae7533958" providerId="LiveId" clId="{01E73667-2BEF-4007-AD34-DC26F6381063}" dt="2024-01-15T15:36:45.423" v="25021" actId="207"/>
       <pc:docMkLst>
         <pc:docMk/>
       </pc:docMkLst>
@@ -3439,13 +3439,13 @@
         </pc:cxnChg>
       </pc:sldChg>
       <pc:sldChg chg="delSp modSp add mod ord">
-        <pc:chgData name="Philippe Baucour" userId="5102170ae7533958" providerId="LiveId" clId="{01E73667-2BEF-4007-AD34-DC26F6381063}" dt="2024-01-15T11:00:02.779" v="24686"/>
+        <pc:chgData name="Philippe Baucour" userId="5102170ae7533958" providerId="LiveId" clId="{01E73667-2BEF-4007-AD34-DC26F6381063}" dt="2024-01-15T14:25:39.933" v="25014" actId="20577"/>
         <pc:sldMkLst>
           <pc:docMk/>
           <pc:sldMk cId="1176226442" sldId="314"/>
         </pc:sldMkLst>
         <pc:spChg chg="mod">
-          <ac:chgData name="Philippe Baucour" userId="5102170ae7533958" providerId="LiveId" clId="{01E73667-2BEF-4007-AD34-DC26F6381063}" dt="2024-01-14T16:08:23.608" v="22134" actId="20577"/>
+          <ac:chgData name="Philippe Baucour" userId="5102170ae7533958" providerId="LiveId" clId="{01E73667-2BEF-4007-AD34-DC26F6381063}" dt="2024-01-15T14:25:39.933" v="25014" actId="20577"/>
           <ac:spMkLst>
             <pc:docMk/>
             <pc:sldMk cId="1176226442" sldId="314"/>
@@ -3491,8 +3491,8 @@
           </ac:spMkLst>
         </pc:spChg>
       </pc:sldChg>
-      <pc:sldChg chg="addSp delSp modSp new mod modAnim">
-        <pc:chgData name="Philippe Baucour" userId="5102170ae7533958" providerId="LiveId" clId="{01E73667-2BEF-4007-AD34-DC26F6381063}" dt="2024-01-15T10:41:52.080" v="24568"/>
+      <pc:sldChg chg="addSp delSp modSp new mod addAnim delAnim modAnim">
+        <pc:chgData name="Philippe Baucour" userId="5102170ae7533958" providerId="LiveId" clId="{01E73667-2BEF-4007-AD34-DC26F6381063}" dt="2024-01-15T15:36:45.423" v="25021" actId="207"/>
         <pc:sldMkLst>
           <pc:docMk/>
           <pc:sldMk cId="2513056592" sldId="316"/>
@@ -3506,7 +3506,7 @@
           </ac:spMkLst>
         </pc:spChg>
         <pc:spChg chg="add mod">
-          <ac:chgData name="Philippe Baucour" userId="5102170ae7533958" providerId="LiveId" clId="{01E73667-2BEF-4007-AD34-DC26F6381063}" dt="2024-01-15T10:25:18.159" v="24314" actId="14100"/>
+          <ac:chgData name="Philippe Baucour" userId="5102170ae7533958" providerId="LiveId" clId="{01E73667-2BEF-4007-AD34-DC26F6381063}" dt="2024-01-15T15:27:39.914" v="25015" actId="207"/>
           <ac:spMkLst>
             <pc:docMk/>
             <pc:sldMk cId="2513056592" sldId="316"/>
@@ -3514,7 +3514,7 @@
           </ac:spMkLst>
         </pc:spChg>
         <pc:spChg chg="add mod">
-          <ac:chgData name="Philippe Baucour" userId="5102170ae7533958" providerId="LiveId" clId="{01E73667-2BEF-4007-AD34-DC26F6381063}" dt="2024-01-15T10:41:13.203" v="24567" actId="1037"/>
+          <ac:chgData name="Philippe Baucour" userId="5102170ae7533958" providerId="LiveId" clId="{01E73667-2BEF-4007-AD34-DC26F6381063}" dt="2024-01-15T15:27:46.855" v="25016" actId="108"/>
           <ac:spMkLst>
             <pc:docMk/>
             <pc:sldMk cId="2513056592" sldId="316"/>
@@ -3530,7 +3530,7 @@
           </ac:spMkLst>
         </pc:spChg>
         <pc:spChg chg="add mod">
-          <ac:chgData name="Philippe Baucour" userId="5102170ae7533958" providerId="LiveId" clId="{01E73667-2BEF-4007-AD34-DC26F6381063}" dt="2024-01-15T10:40:59.293" v="24555" actId="1076"/>
+          <ac:chgData name="Philippe Baucour" userId="5102170ae7533958" providerId="LiveId" clId="{01E73667-2BEF-4007-AD34-DC26F6381063}" dt="2024-01-15T15:28:21.931" v="25019" actId="207"/>
           <ac:spMkLst>
             <pc:docMk/>
             <pc:sldMk cId="2513056592" sldId="316"/>
@@ -3538,7 +3538,7 @@
           </ac:spMkLst>
         </pc:spChg>
         <pc:spChg chg="add mod">
-          <ac:chgData name="Philippe Baucour" userId="5102170ae7533958" providerId="LiveId" clId="{01E73667-2BEF-4007-AD34-DC26F6381063}" dt="2024-01-15T10:28:36.323" v="24392" actId="20577"/>
+          <ac:chgData name="Philippe Baucour" userId="5102170ae7533958" providerId="LiveId" clId="{01E73667-2BEF-4007-AD34-DC26F6381063}" dt="2024-01-15T15:28:30.490" v="25020" actId="207"/>
           <ac:spMkLst>
             <pc:docMk/>
             <pc:sldMk cId="2513056592" sldId="316"/>
@@ -3562,7 +3562,7 @@
           </ac:spMkLst>
         </pc:spChg>
         <pc:spChg chg="add mod">
-          <ac:chgData name="Philippe Baucour" userId="5102170ae7533958" providerId="LiveId" clId="{01E73667-2BEF-4007-AD34-DC26F6381063}" dt="2024-01-15T10:37:32.178" v="24533" actId="14100"/>
+          <ac:chgData name="Philippe Baucour" userId="5102170ae7533958" providerId="LiveId" clId="{01E73667-2BEF-4007-AD34-DC26F6381063}" dt="2024-01-15T15:36:45.423" v="25021" actId="207"/>
           <ac:spMkLst>
             <pc:docMk/>
             <pc:sldMk cId="2513056592" sldId="316"/>
@@ -3713,7 +3713,7 @@
           <a:p>
             <a:fld id="{4471ECC3-BD70-4F1E-B981-43613CDB8BB8}" type="datetimeFigureOut">
               <a:rPr lang="fr-FR" smtClean="0"/>
-              <a:t>14/01/2024</a:t>
+              <a:t>15/01/2024</a:t>
             </a:fld>
             <a:endParaRPr lang="fr-FR"/>
           </a:p>
@@ -6154,7 +6154,7 @@
           <a:p>
             <a:fld id="{814EAAF8-3877-4B4B-B2A5-D637106D66A3}" type="datetimeFigureOut">
               <a:rPr lang="fr-FR" smtClean="0"/>
-              <a:t>14/01/2024</a:t>
+              <a:t>15/01/2024</a:t>
             </a:fld>
             <a:endParaRPr lang="fr-FR"/>
           </a:p>
@@ -6352,7 +6352,7 @@
           <a:p>
             <a:fld id="{814EAAF8-3877-4B4B-B2A5-D637106D66A3}" type="datetimeFigureOut">
               <a:rPr lang="fr-FR" smtClean="0"/>
-              <a:t>14/01/2024</a:t>
+              <a:t>15/01/2024</a:t>
             </a:fld>
             <a:endParaRPr lang="fr-FR"/>
           </a:p>
@@ -6560,7 +6560,7 @@
           <a:p>
             <a:fld id="{814EAAF8-3877-4B4B-B2A5-D637106D66A3}" type="datetimeFigureOut">
               <a:rPr lang="fr-FR" smtClean="0"/>
-              <a:t>14/01/2024</a:t>
+              <a:t>15/01/2024</a:t>
             </a:fld>
             <a:endParaRPr lang="fr-FR"/>
           </a:p>
@@ -6758,7 +6758,7 @@
           <a:p>
             <a:fld id="{814EAAF8-3877-4B4B-B2A5-D637106D66A3}" type="datetimeFigureOut">
               <a:rPr lang="fr-FR" smtClean="0"/>
-              <a:t>14/01/2024</a:t>
+              <a:t>15/01/2024</a:t>
             </a:fld>
             <a:endParaRPr lang="fr-FR"/>
           </a:p>
@@ -7033,7 +7033,7 @@
           <a:p>
             <a:fld id="{814EAAF8-3877-4B4B-B2A5-D637106D66A3}" type="datetimeFigureOut">
               <a:rPr lang="fr-FR" smtClean="0"/>
-              <a:t>14/01/2024</a:t>
+              <a:t>15/01/2024</a:t>
             </a:fld>
             <a:endParaRPr lang="fr-FR"/>
           </a:p>
@@ -7298,7 +7298,7 @@
           <a:p>
             <a:fld id="{814EAAF8-3877-4B4B-B2A5-D637106D66A3}" type="datetimeFigureOut">
               <a:rPr lang="fr-FR" smtClean="0"/>
-              <a:t>14/01/2024</a:t>
+              <a:t>15/01/2024</a:t>
             </a:fld>
             <a:endParaRPr lang="fr-FR"/>
           </a:p>
@@ -7710,7 +7710,7 @@
           <a:p>
             <a:fld id="{814EAAF8-3877-4B4B-B2A5-D637106D66A3}" type="datetimeFigureOut">
               <a:rPr lang="fr-FR" smtClean="0"/>
-              <a:t>14/01/2024</a:t>
+              <a:t>15/01/2024</a:t>
             </a:fld>
             <a:endParaRPr lang="fr-FR"/>
           </a:p>
@@ -7851,7 +7851,7 @@
           <a:p>
             <a:fld id="{814EAAF8-3877-4B4B-B2A5-D637106D66A3}" type="datetimeFigureOut">
               <a:rPr lang="fr-FR" smtClean="0"/>
-              <a:t>14/01/2024</a:t>
+              <a:t>15/01/2024</a:t>
             </a:fld>
             <a:endParaRPr lang="fr-FR"/>
           </a:p>
@@ -7964,7 +7964,7 @@
           <a:p>
             <a:fld id="{814EAAF8-3877-4B4B-B2A5-D637106D66A3}" type="datetimeFigureOut">
               <a:rPr lang="fr-FR" smtClean="0"/>
-              <a:t>14/01/2024</a:t>
+              <a:t>15/01/2024</a:t>
             </a:fld>
             <a:endParaRPr lang="fr-FR"/>
           </a:p>
@@ -8275,7 +8275,7 @@
           <a:p>
             <a:fld id="{814EAAF8-3877-4B4B-B2A5-D637106D66A3}" type="datetimeFigureOut">
               <a:rPr lang="fr-FR" smtClean="0"/>
-              <a:t>14/01/2024</a:t>
+              <a:t>15/01/2024</a:t>
             </a:fld>
             <a:endParaRPr lang="fr-FR"/>
           </a:p>
@@ -8563,7 +8563,7 @@
           <a:p>
             <a:fld id="{814EAAF8-3877-4B4B-B2A5-D637106D66A3}" type="datetimeFigureOut">
               <a:rPr lang="fr-FR" smtClean="0"/>
-              <a:t>14/01/2024</a:t>
+              <a:t>15/01/2024</a:t>
             </a:fld>
             <a:endParaRPr lang="fr-FR"/>
           </a:p>
@@ -8804,7 +8804,7 @@
           <a:p>
             <a:fld id="{814EAAF8-3877-4B4B-B2A5-D637106D66A3}" type="datetimeFigureOut">
               <a:rPr lang="fr-FR" smtClean="0"/>
-              <a:t>14/01/2024</a:t>
+              <a:t>15/01/2024</a:t>
             </a:fld>
             <a:endParaRPr lang="fr-FR"/>
           </a:p>
@@ -18365,8 +18365,8 @@
             </a:fontRef>
           </p:style>
         </p:cxnSp>
-        <mc:AlternateContent xmlns:mc="http://schemas.openxmlformats.org/markup-compatibility/2006">
-          <mc:Choice xmlns:a14="http://schemas.microsoft.com/office/drawing/2010/main" Requires="a14">
+        <mc:AlternateContent xmlns:mc="http://schemas.openxmlformats.org/markup-compatibility/2006" xmlns:a14="http://schemas.microsoft.com/office/drawing/2010/main">
+          <mc:Choice Requires="a14">
             <p:sp>
               <p:nvSpPr>
                 <p:cNvPr id="11" name="ZoneTexte 10">
@@ -18395,6 +18395,7 @@
                 </a:bodyPr>
                 <a:lstStyle/>
                 <a:p>
+                  <a:pPr/>
                   <a14:m>
                     <m:oMathPara xmlns:m="http://schemas.openxmlformats.org/officeDocument/2006/math">
                       <m:oMathParaPr>
@@ -18427,7 +18428,7 @@
               </p:txBody>
             </p:sp>
           </mc:Choice>
-          <mc:Fallback>
+          <mc:Fallback xmlns="">
             <p:sp>
               <p:nvSpPr>
                 <p:cNvPr id="11" name="ZoneTexte 10">
@@ -18473,8 +18474,8 @@
           </mc:Fallback>
         </mc:AlternateContent>
       </p:grpSp>
-      <mc:AlternateContent xmlns:mc="http://schemas.openxmlformats.org/markup-compatibility/2006">
-        <mc:Choice xmlns:a14="http://schemas.microsoft.com/office/drawing/2010/main" Requires="a14">
+      <mc:AlternateContent xmlns:mc="http://schemas.openxmlformats.org/markup-compatibility/2006" xmlns:a14="http://schemas.microsoft.com/office/drawing/2010/main">
+        <mc:Choice Requires="a14">
           <p:sp>
             <p:nvSpPr>
               <p:cNvPr id="13" name="ZoneTexte 12">
@@ -18503,6 +18504,7 @@
               </a:bodyPr>
               <a:lstStyle/>
               <a:p>
+                <a:pPr/>
                 <a14:m>
                   <m:oMathPara xmlns:m="http://schemas.openxmlformats.org/officeDocument/2006/math">
                     <m:oMathParaPr>
@@ -18523,7 +18525,7 @@
             </p:txBody>
           </p:sp>
         </mc:Choice>
-        <mc:Fallback>
+        <mc:Fallback xmlns="">
           <p:sp>
             <p:nvSpPr>
               <p:cNvPr id="13" name="ZoneTexte 12">
@@ -18631,8 +18633,8 @@
             </a:fontRef>
           </p:style>
         </p:cxnSp>
-        <mc:AlternateContent xmlns:mc="http://schemas.openxmlformats.org/markup-compatibility/2006">
-          <mc:Choice xmlns:a14="http://schemas.microsoft.com/office/drawing/2010/main" Requires="a14">
+        <mc:AlternateContent xmlns:mc="http://schemas.openxmlformats.org/markup-compatibility/2006" xmlns:a14="http://schemas.microsoft.com/office/drawing/2010/main">
+          <mc:Choice Requires="a14">
             <p:sp>
               <p:nvSpPr>
                 <p:cNvPr id="18" name="ZoneTexte 17">
@@ -18661,6 +18663,7 @@
                 </a:bodyPr>
                 <a:lstStyle/>
                 <a:p>
+                  <a:pPr/>
                   <a14:m>
                     <m:oMathPara xmlns:m="http://schemas.openxmlformats.org/officeDocument/2006/math">
                       <m:oMathParaPr>
@@ -18693,7 +18696,7 @@
               </p:txBody>
             </p:sp>
           </mc:Choice>
-          <mc:Fallback>
+          <mc:Fallback xmlns="">
             <p:sp>
               <p:nvSpPr>
                 <p:cNvPr id="18" name="ZoneTexte 17">
@@ -19172,8 +19175,8 @@
             </a:fontRef>
           </p:style>
         </p:cxnSp>
-        <mc:AlternateContent xmlns:mc="http://schemas.openxmlformats.org/markup-compatibility/2006">
-          <mc:Choice xmlns:a14="http://schemas.microsoft.com/office/drawing/2010/main" Requires="a14">
+        <mc:AlternateContent xmlns:mc="http://schemas.openxmlformats.org/markup-compatibility/2006" xmlns:a14="http://schemas.microsoft.com/office/drawing/2010/main">
+          <mc:Choice Requires="a14">
             <p:sp>
               <p:nvSpPr>
                 <p:cNvPr id="32" name="ZoneTexte 31">
@@ -19202,6 +19205,7 @@
                 </a:bodyPr>
                 <a:lstStyle/>
                 <a:p>
+                  <a:pPr/>
                   <a14:m>
                     <m:oMathPara xmlns:m="http://schemas.openxmlformats.org/officeDocument/2006/math">
                       <m:oMathParaPr>
@@ -19241,7 +19245,7 @@
               </p:txBody>
             </p:sp>
           </mc:Choice>
-          <mc:Fallback>
+          <mc:Fallback xmlns="">
             <p:sp>
               <p:nvSpPr>
                 <p:cNvPr id="32" name="ZoneTexte 31">
@@ -20226,8 +20230,8 @@
             </a:fontRef>
           </p:style>
         </p:cxnSp>
-        <mc:AlternateContent xmlns:mc="http://schemas.openxmlformats.org/markup-compatibility/2006">
-          <mc:Choice xmlns:a14="http://schemas.microsoft.com/office/drawing/2010/main" Requires="a14">
+        <mc:AlternateContent xmlns:mc="http://schemas.openxmlformats.org/markup-compatibility/2006" xmlns:a14="http://schemas.microsoft.com/office/drawing/2010/main">
+          <mc:Choice Requires="a14">
             <p:sp>
               <p:nvSpPr>
                 <p:cNvPr id="11" name="ZoneTexte 10">
@@ -20256,6 +20260,7 @@
                 </a:bodyPr>
                 <a:lstStyle/>
                 <a:p>
+                  <a:pPr/>
                   <a14:m>
                     <m:oMathPara xmlns:m="http://schemas.openxmlformats.org/officeDocument/2006/math">
                       <m:oMathParaPr>
@@ -20288,7 +20293,7 @@
               </p:txBody>
             </p:sp>
           </mc:Choice>
-          <mc:Fallback>
+          <mc:Fallback xmlns="">
             <p:sp>
               <p:nvSpPr>
                 <p:cNvPr id="11" name="ZoneTexte 10">
@@ -20334,8 +20339,8 @@
           </mc:Fallback>
         </mc:AlternateContent>
       </p:grpSp>
-      <mc:AlternateContent xmlns:mc="http://schemas.openxmlformats.org/markup-compatibility/2006">
-        <mc:Choice xmlns:a14="http://schemas.microsoft.com/office/drawing/2010/main" Requires="a14">
+      <mc:AlternateContent xmlns:mc="http://schemas.openxmlformats.org/markup-compatibility/2006" xmlns:a14="http://schemas.microsoft.com/office/drawing/2010/main">
+        <mc:Choice Requires="a14">
           <p:sp>
             <p:nvSpPr>
               <p:cNvPr id="13" name="ZoneTexte 12">
@@ -20364,6 +20369,7 @@
               </a:bodyPr>
               <a:lstStyle/>
               <a:p>
+                <a:pPr/>
                 <a14:m>
                   <m:oMathPara xmlns:m="http://schemas.openxmlformats.org/officeDocument/2006/math">
                     <m:oMathParaPr>
@@ -20384,7 +20390,7 @@
             </p:txBody>
           </p:sp>
         </mc:Choice>
-        <mc:Fallback>
+        <mc:Fallback xmlns="">
           <p:sp>
             <p:nvSpPr>
               <p:cNvPr id="13" name="ZoneTexte 12">
@@ -20492,8 +20498,8 @@
             </a:fontRef>
           </p:style>
         </p:cxnSp>
-        <mc:AlternateContent xmlns:mc="http://schemas.openxmlformats.org/markup-compatibility/2006">
-          <mc:Choice xmlns:a14="http://schemas.microsoft.com/office/drawing/2010/main" Requires="a14">
+        <mc:AlternateContent xmlns:mc="http://schemas.openxmlformats.org/markup-compatibility/2006" xmlns:a14="http://schemas.microsoft.com/office/drawing/2010/main">
+          <mc:Choice Requires="a14">
             <p:sp>
               <p:nvSpPr>
                 <p:cNvPr id="18" name="ZoneTexte 17">
@@ -20522,6 +20528,7 @@
                 </a:bodyPr>
                 <a:lstStyle/>
                 <a:p>
+                  <a:pPr/>
                   <a14:m>
                     <m:oMathPara xmlns:m="http://schemas.openxmlformats.org/officeDocument/2006/math">
                       <m:oMathParaPr>
@@ -20554,7 +20561,7 @@
               </p:txBody>
             </p:sp>
           </mc:Choice>
-          <mc:Fallback>
+          <mc:Fallback xmlns="">
             <p:sp>
               <p:nvSpPr>
                 <p:cNvPr id="18" name="ZoneTexte 17">
@@ -20915,8 +20922,8 @@
             </a:fontRef>
           </p:style>
         </p:cxnSp>
-        <mc:AlternateContent xmlns:mc="http://schemas.openxmlformats.org/markup-compatibility/2006">
-          <mc:Choice xmlns:a14="http://schemas.microsoft.com/office/drawing/2010/main" Requires="a14">
+        <mc:AlternateContent xmlns:mc="http://schemas.openxmlformats.org/markup-compatibility/2006" xmlns:a14="http://schemas.microsoft.com/office/drawing/2010/main">
+          <mc:Choice Requires="a14">
             <p:sp>
               <p:nvSpPr>
                 <p:cNvPr id="32" name="ZoneTexte 31">
@@ -20945,6 +20952,7 @@
                 </a:bodyPr>
                 <a:lstStyle/>
                 <a:p>
+                  <a:pPr/>
                   <a14:m>
                     <m:oMathPara xmlns:m="http://schemas.openxmlformats.org/officeDocument/2006/math">
                       <m:oMathParaPr>
@@ -20984,7 +20992,7 @@
               </p:txBody>
             </p:sp>
           </mc:Choice>
-          <mc:Fallback>
+          <mc:Fallback xmlns="">
             <p:sp>
               <p:nvSpPr>
                 <p:cNvPr id="32" name="ZoneTexte 31">
@@ -21481,8 +21489,8 @@
           </a:p>
         </p:txBody>
       </p:sp>
-      <mc:AlternateContent xmlns:mc="http://schemas.openxmlformats.org/markup-compatibility/2006">
-        <mc:Choice xmlns:a14="http://schemas.microsoft.com/office/drawing/2010/main" Requires="a14">
+      <mc:AlternateContent xmlns:mc="http://schemas.openxmlformats.org/markup-compatibility/2006" xmlns:a14="http://schemas.microsoft.com/office/drawing/2010/main">
+        <mc:Choice Requires="a14">
           <p:sp>
             <p:nvSpPr>
               <p:cNvPr id="45" name="ZoneTexte 44">
@@ -21511,6 +21519,7 @@
               </a:bodyPr>
               <a:lstStyle/>
               <a:p>
+                <a:pPr/>
                 <a14:m>
                   <m:oMathPara xmlns:m="http://schemas.openxmlformats.org/officeDocument/2006/math">
                     <m:oMathParaPr>
@@ -21631,7 +21640,7 @@
             </p:txBody>
           </p:sp>
         </mc:Choice>
-        <mc:Fallback>
+        <mc:Fallback xmlns="">
           <p:sp>
             <p:nvSpPr>
               <p:cNvPr id="45" name="ZoneTexte 44">
@@ -27622,6 +27631,9 @@
           <a:prstGeom prst="rect">
             <a:avLst/>
           </a:prstGeom>
+          <a:solidFill>
+            <a:srgbClr val="181818"/>
+          </a:solidFill>
         </p:spPr>
         <p:style>
           <a:lnRef idx="2">
@@ -27668,6 +27680,9 @@
           <a:prstGeom prst="rect">
             <a:avLst/>
           </a:prstGeom>
+          <a:solidFill>
+            <a:srgbClr val="181818"/>
+          </a:solidFill>
         </p:spPr>
         <p:style>
           <a:lnRef idx="2">
@@ -27715,7 +27730,7 @@
             <a:avLst/>
           </a:prstGeom>
           <a:solidFill>
-            <a:schemeClr val="tx1"/>
+            <a:srgbClr val="181818"/>
           </a:solidFill>
         </p:spPr>
         <p:txBody>
@@ -27759,7 +27774,7 @@
             <a:avLst/>
           </a:prstGeom>
           <a:solidFill>
-            <a:schemeClr val="tx1"/>
+            <a:srgbClr val="181818"/>
           </a:solidFill>
         </p:spPr>
         <p:txBody>
@@ -28015,6 +28030,9 @@
           <a:prstGeom prst="rect">
             <a:avLst/>
           </a:prstGeom>
+          <a:solidFill>
+            <a:srgbClr val="181818"/>
+          </a:solidFill>
         </p:spPr>
         <p:style>
           <a:lnRef idx="2">
@@ -28914,7 +28932,7 @@
         <p:spPr/>
         <p:txBody>
           <a:bodyPr>
-            <a:normAutofit/>
+            <a:normAutofit fontScale="77500" lnSpcReduction="20000"/>
           </a:bodyPr>
           <a:lstStyle/>
           <a:p>
@@ -28989,6 +29007,113 @@
               <a:t>X_train</a:t>
             </a:r>
             <a:endParaRPr lang="fr-FR" dirty="0"/>
+          </a:p>
+          <a:p>
+            <a:endParaRPr lang="fr-FR" dirty="0"/>
+          </a:p>
+          <a:p>
+            <a:r>
+              <a:rPr lang="fr-FR" dirty="0" err="1">
+                <a:latin typeface="Courier New" panose="02070309020205020404" pitchFamily="49" charset="0"/>
+                <a:cs typeface="Courier New" panose="02070309020205020404" pitchFamily="49" charset="0"/>
+              </a:rPr>
+              <a:t>random_state</a:t>
+            </a:r>
+            <a:r>
+              <a:rPr lang="fr-FR" dirty="0">
+                <a:latin typeface="Courier New" panose="02070309020205020404" pitchFamily="49" charset="0"/>
+                <a:cs typeface="Courier New" panose="02070309020205020404" pitchFamily="49" charset="0"/>
+              </a:rPr>
+              <a:t>=0</a:t>
+            </a:r>
+            <a:r>
+              <a:rPr lang="fr-FR" dirty="0"/>
+              <a:t> </a:t>
+            </a:r>
+          </a:p>
+          <a:p>
+            <a:pPr lvl="1"/>
+            <a:r>
+              <a:rPr lang="fr-FR" dirty="0"/>
+              <a:t>voir </a:t>
+            </a:r>
+            <a:r>
+              <a:rPr lang="fr-FR" dirty="0" err="1"/>
+              <a:t>train_test_split</a:t>
+            </a:r>
+            <a:r>
+              <a:rPr lang="fr-FR" dirty="0"/>
+              <a:t> par ex.</a:t>
+            </a:r>
+          </a:p>
+          <a:p>
+            <a:pPr lvl="1"/>
+            <a:r>
+              <a:rPr lang="fr-FR" dirty="0"/>
+              <a:t>S'assure qu'on aura toujours les mêmes nombres aléatoires générés dans le même ordre.</a:t>
+            </a:r>
+          </a:p>
+          <a:p>
+            <a:pPr lvl="1"/>
+            <a:r>
+              <a:rPr lang="fr-FR" dirty="0"/>
+              <a:t>Permet de comparer les résultats d'un run avec un autre</a:t>
+            </a:r>
+          </a:p>
+          <a:p>
+            <a:endParaRPr lang="fr-FR" dirty="0">
+              <a:latin typeface="Courier New" panose="02070309020205020404" pitchFamily="49" charset="0"/>
+              <a:cs typeface="Courier New" panose="02070309020205020404" pitchFamily="49" charset="0"/>
+            </a:endParaRPr>
+          </a:p>
+          <a:p>
+            <a:r>
+              <a:rPr lang="fr-FR" dirty="0" err="1">
+                <a:latin typeface="Courier New" panose="02070309020205020404" pitchFamily="49" charset="0"/>
+                <a:cs typeface="Courier New" panose="02070309020205020404" pitchFamily="49" charset="0"/>
+              </a:rPr>
+              <a:t>stratify</a:t>
+            </a:r>
+            <a:r>
+              <a:rPr lang="fr-FR" dirty="0">
+                <a:latin typeface="Courier New" panose="02070309020205020404" pitchFamily="49" charset="0"/>
+                <a:cs typeface="Courier New" panose="02070309020205020404" pitchFamily="49" charset="0"/>
+              </a:rPr>
+              <a:t> = y </a:t>
+            </a:r>
+          </a:p>
+          <a:p>
+            <a:pPr lvl="1"/>
+            <a:r>
+              <a:rPr lang="fr-FR" dirty="0"/>
+              <a:t>voir </a:t>
+            </a:r>
+            <a:r>
+              <a:rPr lang="fr-FR" dirty="0" err="1"/>
+              <a:t>train_test_split</a:t>
+            </a:r>
+            <a:r>
+              <a:rPr lang="fr-FR" dirty="0"/>
+              <a:t> par ex.</a:t>
+            </a:r>
+          </a:p>
+          <a:p>
+            <a:pPr lvl="1"/>
+            <a:r>
+              <a:rPr lang="fr-FR" dirty="0"/>
+              <a:t>On veut retrouver dans train et test les mêmes proportions de </a:t>
+            </a:r>
+            <a:r>
+              <a:rPr lang="fr-FR" dirty="0">
+                <a:latin typeface="Courier New" panose="02070309020205020404" pitchFamily="49" charset="0"/>
+                <a:cs typeface="Courier New" panose="02070309020205020404" pitchFamily="49" charset="0"/>
+              </a:rPr>
+              <a:t>y</a:t>
+            </a:r>
+            <a:r>
+              <a:rPr lang="fr-FR" dirty="0"/>
+              <a:t> que dans l'ensemble de départ</a:t>
+            </a:r>
           </a:p>
         </p:txBody>
       </p:sp>

</xml_diff>

<commit_message>
prepa cours 16 01 24
</commit_message>
<xml_diff>
--- a/00_notes_de_stage.pptx
+++ b/00_notes_de_stage.pptx
@@ -52,8 +52,8 @@
     <p:sldId id="310" r:id="rId43"/>
     <p:sldId id="315" r:id="rId44"/>
     <p:sldId id="316" r:id="rId45"/>
-    <p:sldId id="314" r:id="rId46"/>
-    <p:sldId id="272" r:id="rId47"/>
+    <p:sldId id="272" r:id="rId46"/>
+    <p:sldId id="314" r:id="rId47"/>
     <p:sldId id="268" r:id="rId48"/>
     <p:sldId id="277" r:id="rId49"/>
     <p:sldId id="282" r:id="rId50"/>
@@ -177,7 +177,7 @@
 <file path=ppt/revisionInfo.xml><?xml version="1.0" encoding="utf-8"?>
 <p1510:revInfo xmlns:a="http://schemas.openxmlformats.org/drawingml/2006/main" xmlns:r="http://schemas.openxmlformats.org/officeDocument/2006/relationships" xmlns:p1510="http://schemas.microsoft.com/office/powerpoint/2015/10/main">
   <p1510:revLst>
-    <p1510:client id="{01E73667-2BEF-4007-AD34-DC26F6381063}" v="840" dt="2024-01-15T10:41:52.080"/>
+    <p1510:client id="{01E73667-2BEF-4007-AD34-DC26F6381063}" v="1063" dt="2024-01-16T10:04:51.904"/>
   </p1510:revLst>
 </p1510:revInfo>
 </file>
@@ -211,7 +211,7 @@
   <pc:docChgLst>
     <pc:chgData name="Philippe Baucour" userId="5102170ae7533958" providerId="LiveId" clId="{01E73667-2BEF-4007-AD34-DC26F6381063}"/>
     <pc:docChg chg="undo custSel addSld delSld modSld sldOrd">
-      <pc:chgData name="Philippe Baucour" userId="5102170ae7533958" providerId="LiveId" clId="{01E73667-2BEF-4007-AD34-DC26F6381063}" dt="2024-01-15T15:36:45.423" v="25021" actId="207"/>
+      <pc:chgData name="Philippe Baucour" userId="5102170ae7533958" providerId="LiveId" clId="{01E73667-2BEF-4007-AD34-DC26F6381063}" dt="2024-01-16T10:06:44.402" v="25692" actId="6549"/>
       <pc:docMkLst>
         <pc:docMk/>
       </pc:docMkLst>
@@ -1365,7 +1365,7 @@
         </pc:picChg>
       </pc:sldChg>
       <pc:sldChg chg="addSp modSp new mod ord modNotesTx">
-        <pc:chgData name="Philippe Baucour" userId="5102170ae7533958" providerId="LiveId" clId="{01E73667-2BEF-4007-AD34-DC26F6381063}" dt="2024-01-15T10:59:15.720" v="24684" actId="20577"/>
+        <pc:chgData name="Philippe Baucour" userId="5102170ae7533958" providerId="LiveId" clId="{01E73667-2BEF-4007-AD34-DC26F6381063}" dt="2024-01-16T09:02:11.892" v="25038"/>
         <pc:sldMkLst>
           <pc:docMk/>
           <pc:sldMk cId="4183092790" sldId="272"/>
@@ -1933,7 +1933,7 @@
         </pc:spChg>
       </pc:sldChg>
       <pc:sldChg chg="addSp delSp modSp new mod modAnim modNotesTx">
-        <pc:chgData name="Philippe Baucour" userId="5102170ae7533958" providerId="LiveId" clId="{01E73667-2BEF-4007-AD34-DC26F6381063}" dt="2024-01-14T16:19:17.427" v="22243" actId="20577"/>
+        <pc:chgData name="Philippe Baucour" userId="5102170ae7533958" providerId="LiveId" clId="{01E73667-2BEF-4007-AD34-DC26F6381063}" dt="2024-01-16T09:57:40.838" v="25659"/>
         <pc:sldMkLst>
           <pc:docMk/>
           <pc:sldMk cId="4079956193" sldId="286"/>
@@ -1947,7 +1947,7 @@
           </ac:spMkLst>
         </pc:spChg>
         <pc:spChg chg="mod">
-          <ac:chgData name="Philippe Baucour" userId="5102170ae7533958" providerId="LiveId" clId="{01E73667-2BEF-4007-AD34-DC26F6381063}" dt="2024-01-14T16:19:17.427" v="22243" actId="20577"/>
+          <ac:chgData name="Philippe Baucour" userId="5102170ae7533958" providerId="LiveId" clId="{01E73667-2BEF-4007-AD34-DC26F6381063}" dt="2024-01-16T09:22:08.624" v="25283" actId="20577"/>
           <ac:spMkLst>
             <pc:docMk/>
             <pc:sldMk cId="4079956193" sldId="286"/>
@@ -2035,7 +2035,7 @@
           </ac:spMkLst>
         </pc:spChg>
         <pc:spChg chg="add mod">
-          <ac:chgData name="Philippe Baucour" userId="5102170ae7533958" providerId="LiveId" clId="{01E73667-2BEF-4007-AD34-DC26F6381063}" dt="2023-12-15T15:14:52.997" v="13136" actId="6549"/>
+          <ac:chgData name="Philippe Baucour" userId="5102170ae7533958" providerId="LiveId" clId="{01E73667-2BEF-4007-AD34-DC26F6381063}" dt="2024-01-16T09:21:36.990" v="25281" actId="20577"/>
           <ac:spMkLst>
             <pc:docMk/>
             <pc:sldMk cId="4079956193" sldId="286"/>
@@ -2059,7 +2059,7 @@
           </ac:spMkLst>
         </pc:spChg>
         <pc:spChg chg="add mod">
-          <ac:chgData name="Philippe Baucour" userId="5102170ae7533958" providerId="LiveId" clId="{01E73667-2BEF-4007-AD34-DC26F6381063}" dt="2024-01-14T16:14:06.266" v="22224" actId="1038"/>
+          <ac:chgData name="Philippe Baucour" userId="5102170ae7533958" providerId="LiveId" clId="{01E73667-2BEF-4007-AD34-DC26F6381063}" dt="2024-01-16T09:04:41.044" v="25064" actId="20577"/>
           <ac:spMkLst>
             <pc:docMk/>
             <pc:sldMk cId="4079956193" sldId="286"/>
@@ -2074,6 +2074,14 @@
             <ac:spMk id="14" creationId="{543AA405-4F75-E3D6-6708-ED069BCB2535}"/>
           </ac:spMkLst>
         </pc:spChg>
+        <pc:spChg chg="add del mod">
+          <ac:chgData name="Philippe Baucour" userId="5102170ae7533958" providerId="LiveId" clId="{01E73667-2BEF-4007-AD34-DC26F6381063}" dt="2024-01-16T09:05:44.226" v="25069" actId="478"/>
+          <ac:spMkLst>
+            <pc:docMk/>
+            <pc:sldMk cId="4079956193" sldId="286"/>
+            <ac:spMk id="15" creationId="{D35CBA88-18A1-E84F-ED45-167146F9EBF8}"/>
+          </ac:spMkLst>
+        </pc:spChg>
         <pc:picChg chg="add mod ord modCrop">
           <ac:chgData name="Philippe Baucour" userId="5102170ae7533958" providerId="LiveId" clId="{01E73667-2BEF-4007-AD34-DC26F6381063}" dt="2023-12-13T22:37:46.938" v="7264" actId="1037"/>
           <ac:picMkLst>
@@ -2083,36 +2091,116 @@
           </ac:picMkLst>
         </pc:picChg>
       </pc:sldChg>
-      <pc:sldChg chg="addSp modSp new mod">
-        <pc:chgData name="Philippe Baucour" userId="5102170ae7533958" providerId="LiveId" clId="{01E73667-2BEF-4007-AD34-DC26F6381063}" dt="2024-01-14T16:18:53.019" v="22240" actId="1076"/>
+      <pc:sldChg chg="addSp delSp modSp new mod modAnim modNotesTx">
+        <pc:chgData name="Philippe Baucour" userId="5102170ae7533958" providerId="LiveId" clId="{01E73667-2BEF-4007-AD34-DC26F6381063}" dt="2024-01-16T10:06:44.402" v="25692" actId="6549"/>
         <pc:sldMkLst>
           <pc:docMk/>
           <pc:sldMk cId="2203231843" sldId="287"/>
         </pc:sldMkLst>
         <pc:spChg chg="mod">
-          <ac:chgData name="Philippe Baucour" userId="5102170ae7533958" providerId="LiveId" clId="{01E73667-2BEF-4007-AD34-DC26F6381063}" dt="2023-12-13T10:56:14.403" v="6913" actId="20577"/>
+          <ac:chgData name="Philippe Baucour" userId="5102170ae7533958" providerId="LiveId" clId="{01E73667-2BEF-4007-AD34-DC26F6381063}" dt="2024-01-16T09:49:04.722" v="25585" actId="20577"/>
+          <ac:spMkLst>
+            <pc:docMk/>
+            <pc:sldMk cId="2203231843" sldId="287"/>
+            <ac:spMk id="2" creationId="{77EAEFC5-77FE-9822-72C3-62FB2337FE34}"/>
+          </ac:spMkLst>
+        </pc:spChg>
+        <pc:spChg chg="mod">
+          <ac:chgData name="Philippe Baucour" userId="5102170ae7533958" providerId="LiveId" clId="{01E73667-2BEF-4007-AD34-DC26F6381063}" dt="2024-01-16T10:03:41.648" v="25677" actId="20577"/>
           <ac:spMkLst>
             <pc:docMk/>
             <pc:sldMk cId="2203231843" sldId="287"/>
             <ac:spMk id="3" creationId="{F27994BF-B3DE-D405-1556-56C36862DB7A}"/>
           </ac:spMkLst>
         </pc:spChg>
-        <pc:spChg chg="add mod">
-          <ac:chgData name="Philippe Baucour" userId="5102170ae7533958" providerId="LiveId" clId="{01E73667-2BEF-4007-AD34-DC26F6381063}" dt="2024-01-14T16:18:53.019" v="22240" actId="1076"/>
+        <pc:spChg chg="add del mod">
+          <ac:chgData name="Philippe Baucour" userId="5102170ae7533958" providerId="LiveId" clId="{01E73667-2BEF-4007-AD34-DC26F6381063}" dt="2024-01-16T09:52:19.302" v="25625" actId="478"/>
           <ac:spMkLst>
             <pc:docMk/>
             <pc:sldMk cId="2203231843" sldId="287"/>
             <ac:spMk id="4" creationId="{BC769971-6696-B68B-7A7E-C22BD1307536}"/>
           </ac:spMkLst>
         </pc:spChg>
-        <pc:spChg chg="add mod">
-          <ac:chgData name="Philippe Baucour" userId="5102170ae7533958" providerId="LiveId" clId="{01E73667-2BEF-4007-AD34-DC26F6381063}" dt="2024-01-14T16:18:47.520" v="22239" actId="1076"/>
+        <pc:spChg chg="add del mod">
+          <ac:chgData name="Philippe Baucour" userId="5102170ae7533958" providerId="LiveId" clId="{01E73667-2BEF-4007-AD34-DC26F6381063}" dt="2024-01-16T09:52:22.088" v="25626" actId="478"/>
           <ac:spMkLst>
             <pc:docMk/>
             <pc:sldMk cId="2203231843" sldId="287"/>
             <ac:spMk id="5" creationId="{6722959C-02DD-0821-1CC0-81C189230146}"/>
           </ac:spMkLst>
         </pc:spChg>
+        <pc:spChg chg="add mod">
+          <ac:chgData name="Philippe Baucour" userId="5102170ae7533958" providerId="LiveId" clId="{01E73667-2BEF-4007-AD34-DC26F6381063}" dt="2024-01-16T09:47:58.227" v="25571"/>
+          <ac:spMkLst>
+            <pc:docMk/>
+            <pc:sldMk cId="2203231843" sldId="287"/>
+            <ac:spMk id="7" creationId="{903BB74F-E6CB-B1E7-21B5-F9FC5A4F9262}"/>
+          </ac:spMkLst>
+        </pc:spChg>
+        <pc:spChg chg="add mod">
+          <ac:chgData name="Philippe Baucour" userId="5102170ae7533958" providerId="LiveId" clId="{01E73667-2BEF-4007-AD34-DC26F6381063}" dt="2024-01-16T09:47:58.227" v="25571"/>
+          <ac:spMkLst>
+            <pc:docMk/>
+            <pc:sldMk cId="2203231843" sldId="287"/>
+            <ac:spMk id="8" creationId="{B151808F-66C2-A29F-B517-2E77CB35EA0D}"/>
+          </ac:spMkLst>
+        </pc:spChg>
+        <pc:spChg chg="add mod">
+          <ac:chgData name="Philippe Baucour" userId="5102170ae7533958" providerId="LiveId" clId="{01E73667-2BEF-4007-AD34-DC26F6381063}" dt="2024-01-16T09:47:58.227" v="25571"/>
+          <ac:spMkLst>
+            <pc:docMk/>
+            <pc:sldMk cId="2203231843" sldId="287"/>
+            <ac:spMk id="9" creationId="{2A182E55-D27E-DCE7-C0D2-AD7A05844F32}"/>
+          </ac:spMkLst>
+        </pc:spChg>
+        <pc:spChg chg="add mod">
+          <ac:chgData name="Philippe Baucour" userId="5102170ae7533958" providerId="LiveId" clId="{01E73667-2BEF-4007-AD34-DC26F6381063}" dt="2024-01-16T09:47:58.227" v="25571"/>
+          <ac:spMkLst>
+            <pc:docMk/>
+            <pc:sldMk cId="2203231843" sldId="287"/>
+            <ac:spMk id="10" creationId="{94C51D79-EF7C-AB50-23B8-8D20A261FECE}"/>
+          </ac:spMkLst>
+        </pc:spChg>
+        <pc:spChg chg="add mod">
+          <ac:chgData name="Philippe Baucour" userId="5102170ae7533958" providerId="LiveId" clId="{01E73667-2BEF-4007-AD34-DC26F6381063}" dt="2024-01-16T09:47:58.227" v="25571"/>
+          <ac:spMkLst>
+            <pc:docMk/>
+            <pc:sldMk cId="2203231843" sldId="287"/>
+            <ac:spMk id="11" creationId="{34E0538E-23B4-71CE-3C2D-9817412EE88A}"/>
+          </ac:spMkLst>
+        </pc:spChg>
+        <pc:spChg chg="add mod">
+          <ac:chgData name="Philippe Baucour" userId="5102170ae7533958" providerId="LiveId" clId="{01E73667-2BEF-4007-AD34-DC26F6381063}" dt="2024-01-16T09:47:58.227" v="25571"/>
+          <ac:spMkLst>
+            <pc:docMk/>
+            <pc:sldMk cId="2203231843" sldId="287"/>
+            <ac:spMk id="12" creationId="{2B2780A1-6B03-466D-6689-6AACCC9C683D}"/>
+          </ac:spMkLst>
+        </pc:spChg>
+        <pc:spChg chg="add mod">
+          <ac:chgData name="Philippe Baucour" userId="5102170ae7533958" providerId="LiveId" clId="{01E73667-2BEF-4007-AD34-DC26F6381063}" dt="2024-01-16T09:47:58.227" v="25571"/>
+          <ac:spMkLst>
+            <pc:docMk/>
+            <pc:sldMk cId="2203231843" sldId="287"/>
+            <ac:spMk id="13" creationId="{75A7DDCB-B46A-C143-0CBA-80767CE342F5}"/>
+          </ac:spMkLst>
+        </pc:spChg>
+        <pc:spChg chg="add mod">
+          <ac:chgData name="Philippe Baucour" userId="5102170ae7533958" providerId="LiveId" clId="{01E73667-2BEF-4007-AD34-DC26F6381063}" dt="2024-01-16T09:47:58.227" v="25571"/>
+          <ac:spMkLst>
+            <pc:docMk/>
+            <pc:sldMk cId="2203231843" sldId="287"/>
+            <ac:spMk id="14" creationId="{9866827D-2133-07C8-A144-3F2EC112ED77}"/>
+          </ac:spMkLst>
+        </pc:spChg>
+        <pc:picChg chg="add mod">
+          <ac:chgData name="Philippe Baucour" userId="5102170ae7533958" providerId="LiveId" clId="{01E73667-2BEF-4007-AD34-DC26F6381063}" dt="2024-01-16T09:47:58.227" v="25571"/>
+          <ac:picMkLst>
+            <pc:docMk/>
+            <pc:sldMk cId="2203231843" sldId="287"/>
+            <ac:picMk id="6" creationId="{16232193-5BE7-0ACA-60D2-87BC5AE0EB8A}"/>
+          </ac:picMkLst>
+        </pc:picChg>
       </pc:sldChg>
       <pc:sldChg chg="modSp add mod">
         <pc:chgData name="Philippe Baucour" userId="5102170ae7533958" providerId="LiveId" clId="{01E73667-2BEF-4007-AD34-DC26F6381063}" dt="2023-12-13T22:55:41.826" v="7410" actId="20577"/>
@@ -3439,13 +3527,13 @@
         </pc:cxnChg>
       </pc:sldChg>
       <pc:sldChg chg="delSp modSp add mod ord">
-        <pc:chgData name="Philippe Baucour" userId="5102170ae7533958" providerId="LiveId" clId="{01E73667-2BEF-4007-AD34-DC26F6381063}" dt="2024-01-15T14:25:39.933" v="25014" actId="20577"/>
+        <pc:chgData name="Philippe Baucour" userId="5102170ae7533958" providerId="LiveId" clId="{01E73667-2BEF-4007-AD34-DC26F6381063}" dt="2024-01-16T09:01:36.922" v="25036" actId="20577"/>
         <pc:sldMkLst>
           <pc:docMk/>
           <pc:sldMk cId="1176226442" sldId="314"/>
         </pc:sldMkLst>
         <pc:spChg chg="mod">
-          <ac:chgData name="Philippe Baucour" userId="5102170ae7533958" providerId="LiveId" clId="{01E73667-2BEF-4007-AD34-DC26F6381063}" dt="2024-01-15T14:25:39.933" v="25014" actId="20577"/>
+          <ac:chgData name="Philippe Baucour" userId="5102170ae7533958" providerId="LiveId" clId="{01E73667-2BEF-4007-AD34-DC26F6381063}" dt="2024-01-16T09:01:36.922" v="25036" actId="20577"/>
           <ac:spMkLst>
             <pc:docMk/>
             <pc:sldMk cId="1176226442" sldId="314"/>
@@ -3713,7 +3801,7 @@
           <a:p>
             <a:fld id="{4471ECC3-BD70-4F1E-B981-43613CDB8BB8}" type="datetimeFigureOut">
               <a:rPr lang="fr-FR" smtClean="0"/>
-              <a:t>15/01/2024</a:t>
+              <a:t>16/01/2024</a:t>
             </a:fld>
             <a:endParaRPr lang="fr-FR"/>
           </a:p>
@@ -4117,6 +4205,96 @@
 </p:notes>
 </file>
 
+<file path=ppt/notesSlides/notesSlide10.xml><?xml version="1.0" encoding="utf-8"?>
+<p:notes xmlns:a="http://schemas.openxmlformats.org/drawingml/2006/main" xmlns:r="http://schemas.openxmlformats.org/officeDocument/2006/relationships" xmlns:p="http://schemas.openxmlformats.org/presentationml/2006/main">
+  <p:cSld>
+    <p:spTree>
+      <p:nvGrpSpPr>
+        <p:cNvPr id="1" name=""/>
+        <p:cNvGrpSpPr/>
+        <p:nvPr/>
+      </p:nvGrpSpPr>
+      <p:grpSpPr>
+        <a:xfrm>
+          <a:off x="0" y="0"/>
+          <a:ext cx="0" cy="0"/>
+          <a:chOff x="0" y="0"/>
+          <a:chExt cx="0" cy="0"/>
+        </a:xfrm>
+      </p:grpSpPr>
+      <p:sp>
+        <p:nvSpPr>
+          <p:cNvPr id="2" name="Espace réservé de l'image des diapositives 1"/>
+          <p:cNvSpPr>
+            <a:spLocks noGrp="1" noRot="1" noChangeAspect="1"/>
+          </p:cNvSpPr>
+          <p:nvPr>
+            <p:ph type="sldImg"/>
+          </p:nvPr>
+        </p:nvSpPr>
+        <p:spPr/>
+      </p:sp>
+      <p:sp>
+        <p:nvSpPr>
+          <p:cNvPr id="3" name="Espace réservé des notes 2"/>
+          <p:cNvSpPr>
+            <a:spLocks noGrp="1"/>
+          </p:cNvSpPr>
+          <p:nvPr>
+            <p:ph type="body" idx="1"/>
+          </p:nvPr>
+        </p:nvSpPr>
+        <p:spPr/>
+        <p:txBody>
+          <a:bodyPr/>
+          <a:lstStyle/>
+          <a:p>
+            <a:r>
+              <a:rPr lang="fr-FR" dirty="0"/>
+              <a:t>Open Gambit : https://www.oreilly.com/library/view/presentation-skills-that/9780133443035/book3_ch05s02.html</a:t>
+            </a:r>
+          </a:p>
+          <a:p>
+            <a:endParaRPr lang="fr-FR" dirty="0"/>
+          </a:p>
+        </p:txBody>
+      </p:sp>
+      <p:sp>
+        <p:nvSpPr>
+          <p:cNvPr id="4" name="Espace réservé du numéro de diapositive 3"/>
+          <p:cNvSpPr>
+            <a:spLocks noGrp="1"/>
+          </p:cNvSpPr>
+          <p:nvPr>
+            <p:ph type="sldNum" sz="quarter" idx="5"/>
+          </p:nvPr>
+        </p:nvSpPr>
+        <p:spPr/>
+        <p:txBody>
+          <a:bodyPr/>
+          <a:lstStyle/>
+          <a:p>
+            <a:fld id="{CA52ACDA-CAD7-4952-B2DF-2528E011DCB5}" type="slidenum">
+              <a:rPr lang="fr-FR" smtClean="0"/>
+              <a:t>59</a:t>
+            </a:fld>
+            <a:endParaRPr lang="fr-FR"/>
+          </a:p>
+        </p:txBody>
+      </p:sp>
+    </p:spTree>
+    <p:extLst>
+      <p:ext uri="{BB962C8B-B14F-4D97-AF65-F5344CB8AC3E}">
+        <p14:creationId xmlns:p14="http://schemas.microsoft.com/office/powerpoint/2010/main" val="2069620183"/>
+      </p:ext>
+    </p:extLst>
+  </p:cSld>
+  <p:clrMapOvr>
+    <a:masterClrMapping/>
+  </p:clrMapOvr>
+</p:notes>
+</file>
+
 <file path=ppt/notesSlides/notesSlide2.xml><?xml version="1.0" encoding="utf-8"?>
 <p:notes xmlns:a="http://schemas.openxmlformats.org/drawingml/2006/main" xmlns:r="http://schemas.openxmlformats.org/officeDocument/2006/relationships" xmlns:p="http://schemas.openxmlformats.org/presentationml/2006/main">
   <p:cSld>
@@ -5671,7 +5849,7 @@
           <a:p>
             <a:fld id="{CA52ACDA-CAD7-4952-B2DF-2528E011DCB5}" type="slidenum">
               <a:rPr lang="fr-FR" smtClean="0"/>
-              <a:t>46</a:t>
+              <a:t>45</a:t>
             </a:fld>
             <a:endParaRPr lang="fr-FR"/>
           </a:p>
@@ -5734,149 +5912,6 @@
           <a:bodyPr/>
           <a:lstStyle/>
           <a:p>
-            <a:r>
-              <a:rPr lang="fr-FR" dirty="0"/>
-              <a:t>Pour le cancer (=1)</a:t>
-            </a:r>
-          </a:p>
-          <a:p>
-            <a:r>
-              <a:rPr lang="fr-FR" dirty="0"/>
-              <a:t>On se place en TP</a:t>
-            </a:r>
-          </a:p>
-          <a:p>
-            <a:r>
-              <a:rPr lang="fr-FR" dirty="0"/>
-              <a:t>On veut un FP faible ?  On observe pas de cancer (=0) alors qu'on a prédit cancer ? Je sais pas   </a:t>
-            </a:r>
-          </a:p>
-          <a:p>
-            <a:r>
-              <a:rPr lang="fr-FR" dirty="0"/>
-              <a:t>On veut un FN faible ? On observe un cancer (=1)        alors qu'on a prédit pas de cancer ? Non ! =&gt; FN=0 =&gt; </a:t>
-            </a:r>
-            <a:r>
-              <a:rPr lang="fr-FR" dirty="0" err="1"/>
-              <a:t>Recall</a:t>
-            </a:r>
-            <a:r>
-              <a:rPr lang="fr-FR" dirty="0"/>
-              <a:t> = 1</a:t>
-            </a:r>
-          </a:p>
-          <a:p>
-            <a:endParaRPr lang="fr-FR" dirty="0"/>
-          </a:p>
-          <a:p>
-            <a:r>
-              <a:rPr lang="fr-FR" dirty="0"/>
-              <a:t>Carte bancaire identifiée comme fausse (=1)</a:t>
-            </a:r>
-          </a:p>
-          <a:p>
-            <a:r>
-              <a:rPr lang="fr-FR" dirty="0"/>
-              <a:t>On se place en TP </a:t>
-            </a:r>
-          </a:p>
-          <a:p>
-            <a:r>
-              <a:rPr lang="fr-FR" dirty="0"/>
-              <a:t>On veut un FN faible? Carte identifiée fausse alors qu'elle est vraie ? Je ne sais pas</a:t>
-            </a:r>
-          </a:p>
-          <a:p>
-            <a:r>
-              <a:rPr lang="fr-FR" dirty="0"/>
-              <a:t>On veut un FP faible? Carte identifiée vraie alors qu'elle est observée comme fausse ? Non ! =&gt; FP=0 =&gt; </a:t>
-            </a:r>
-            <a:r>
-              <a:rPr lang="fr-FR" dirty="0" err="1"/>
-              <a:t>Precision</a:t>
-            </a:r>
-            <a:r>
-              <a:rPr lang="fr-FR" dirty="0"/>
-              <a:t> =1</a:t>
-            </a:r>
-          </a:p>
-          <a:p>
-            <a:endParaRPr lang="fr-FR" dirty="0"/>
-          </a:p>
-          <a:p>
-            <a:r>
-              <a:rPr lang="fr-FR" dirty="0"/>
-              <a:t>Mails identifiés comme SPAM (=1)</a:t>
-            </a:r>
-          </a:p>
-          <a:p>
-            <a:r>
-              <a:rPr lang="fr-FR" dirty="0"/>
-              <a:t>On se place en TP</a:t>
-            </a:r>
-          </a:p>
-          <a:p>
-            <a:r>
-              <a:rPr lang="fr-FR" dirty="0"/>
-              <a:t>On veut un FN faible ? Mail observé comme SPAM alors qu'on l'a prédit comme BON ? Je sais pas</a:t>
-            </a:r>
-          </a:p>
-          <a:p>
-            <a:r>
-              <a:rPr lang="fr-FR" dirty="0"/>
-              <a:t>On veut un FP faible ? Mail observé comme BON alors qu'on l'a prédit comme SPAM ? Non ! =&gt; FP=0 =&gt; </a:t>
-            </a:r>
-            <a:r>
-              <a:rPr lang="fr-FR" dirty="0" err="1"/>
-              <a:t>Precision</a:t>
-            </a:r>
-            <a:r>
-              <a:rPr lang="fr-FR" dirty="0"/>
-              <a:t> = 1 </a:t>
-            </a:r>
-          </a:p>
-          <a:p>
-            <a:endParaRPr lang="fr-FR" dirty="0"/>
-          </a:p>
-          <a:p>
-            <a:r>
-              <a:rPr lang="fr-FR" dirty="0"/>
-              <a:t>Mails identifiés comme BON (=1)</a:t>
-            </a:r>
-          </a:p>
-          <a:p>
-            <a:r>
-              <a:rPr lang="fr-FR" dirty="0"/>
-              <a:t>On se place en TP</a:t>
-            </a:r>
-          </a:p>
-          <a:p>
-            <a:r>
-              <a:rPr lang="fr-FR" dirty="0"/>
-              <a:t>On veut un FP faible ?  Mail observé comme SPAM alors qu'on l'a prédit comme BON ?  Je sais pas   </a:t>
-            </a:r>
-          </a:p>
-          <a:p>
-            <a:r>
-              <a:rPr lang="fr-FR" dirty="0"/>
-              <a:t>On veut un FN faible ? Mail observé BON                alors qu'on l'a prédit comme SPAM ? Non ! =&gt; FN=0 =&gt; </a:t>
-            </a:r>
-            <a:r>
-              <a:rPr lang="fr-FR" dirty="0" err="1"/>
-              <a:t>Recall</a:t>
-            </a:r>
-            <a:r>
-              <a:rPr lang="fr-FR" dirty="0"/>
-              <a:t> = 1</a:t>
-            </a:r>
-          </a:p>
-          <a:p>
-            <a:endParaRPr lang="fr-FR" dirty="0"/>
-          </a:p>
-          <a:p>
-            <a:endParaRPr lang="fr-FR" dirty="0"/>
-          </a:p>
-          <a:p>
             <a:endParaRPr lang="fr-FR" dirty="0"/>
           </a:p>
         </p:txBody>
@@ -5962,9 +5997,234 @@
           <a:lstStyle/>
           <a:p>
             <a:r>
+              <a:rPr lang="en-US" b="1" i="1" dirty="0">
+                <a:solidFill>
+                  <a:srgbClr val="292929"/>
+                </a:solidFill>
+                <a:effectLst/>
+                <a:latin typeface="Inter"/>
+              </a:rPr>
+              <a:t>Precision</a:t>
+            </a:r>
+            <a:r>
+              <a:rPr lang="en-US" b="0" i="1" dirty="0">
+                <a:solidFill>
+                  <a:srgbClr val="292929"/>
+                </a:solidFill>
+                <a:effectLst/>
+                <a:latin typeface="Inter"/>
+              </a:rPr>
+              <a:t> is important when </a:t>
+            </a:r>
+            <a:r>
+              <a:rPr lang="en-US" b="1" i="1" dirty="0">
+                <a:solidFill>
+                  <a:srgbClr val="292929"/>
+                </a:solidFill>
+                <a:effectLst/>
+                <a:latin typeface="Inter"/>
+              </a:rPr>
+              <a:t>False Positives</a:t>
+            </a:r>
+            <a:r>
+              <a:rPr lang="en-US" b="0" i="1" dirty="0">
+                <a:solidFill>
+                  <a:srgbClr val="292929"/>
+                </a:solidFill>
+                <a:effectLst/>
+                <a:latin typeface="Inter"/>
+              </a:rPr>
+              <a:t> are costly. </a:t>
+            </a:r>
+          </a:p>
+          <a:p>
+            <a:r>
+              <a:rPr lang="en-US" b="1" i="1" dirty="0">
+                <a:solidFill>
+                  <a:srgbClr val="292929"/>
+                </a:solidFill>
+                <a:effectLst/>
+                <a:latin typeface="Inter"/>
+              </a:rPr>
+              <a:t>Recall</a:t>
+            </a:r>
+            <a:r>
+              <a:rPr lang="en-US" b="0" i="1" dirty="0">
+                <a:solidFill>
+                  <a:srgbClr val="292929"/>
+                </a:solidFill>
+                <a:effectLst/>
+                <a:latin typeface="Inter"/>
+              </a:rPr>
+              <a:t> is important in scenarios where </a:t>
+            </a:r>
+            <a:r>
+              <a:rPr lang="en-US" b="1" i="1" dirty="0">
+                <a:solidFill>
+                  <a:srgbClr val="292929"/>
+                </a:solidFill>
+                <a:effectLst/>
+                <a:latin typeface="Inter"/>
+              </a:rPr>
+              <a:t>False Negatives</a:t>
+            </a:r>
+            <a:r>
+              <a:rPr lang="en-US" b="0" i="1" dirty="0">
+                <a:solidFill>
+                  <a:srgbClr val="292929"/>
+                </a:solidFill>
+                <a:effectLst/>
+                <a:latin typeface="Inter"/>
+              </a:rPr>
+              <a:t> are costly.</a:t>
+            </a:r>
+            <a:endParaRPr lang="fr-FR" dirty="0"/>
+          </a:p>
+          <a:p>
+            <a:endParaRPr lang="fr-FR" dirty="0"/>
+          </a:p>
+          <a:p>
+            <a:r>
               <a:rPr lang="fr-FR" dirty="0"/>
-              <a:t>Open Gambit : https://www.oreilly.com/library/view/presentation-skills-that/9780133443035/book3_ch05s02.html</a:t>
-            </a:r>
+              <a:t>Carte bancaire identifiée comme fausse (=1)</a:t>
+            </a:r>
+          </a:p>
+          <a:p>
+            <a:r>
+              <a:rPr lang="fr-FR" dirty="0"/>
+              <a:t>On se place en TP </a:t>
+            </a:r>
+          </a:p>
+          <a:p>
+            <a:r>
+              <a:rPr lang="fr-FR" dirty="0"/>
+              <a:t>On peut accepter FP non nul? Carte observée vraie alors qu'on a prédit fausse ? Je ne sais pas</a:t>
+            </a:r>
+          </a:p>
+          <a:p>
+            <a:r>
+              <a:rPr lang="fr-FR" dirty="0"/>
+              <a:t>On peut accepter FN non nul? Carte observée fausse alors qu'on a prédit vraie ? Non ! =&gt; FN=0 =&gt; </a:t>
+            </a:r>
+            <a:r>
+              <a:rPr lang="fr-FR" dirty="0" err="1"/>
+              <a:t>Recall</a:t>
+            </a:r>
+            <a:r>
+              <a:rPr lang="fr-FR" dirty="0"/>
+              <a:t> =1</a:t>
+            </a:r>
+          </a:p>
+          <a:p>
+            <a:endParaRPr lang="fr-FR" dirty="0"/>
+          </a:p>
+          <a:p>
+            <a:r>
+              <a:rPr lang="fr-FR" dirty="0"/>
+              <a:t>Mails identifiés comme SPAM (=1)</a:t>
+            </a:r>
+          </a:p>
+          <a:p>
+            <a:r>
+              <a:rPr lang="fr-FR" dirty="0"/>
+              <a:t>On se place en TP</a:t>
+            </a:r>
+          </a:p>
+          <a:p>
+            <a:r>
+              <a:rPr lang="fr-FR" dirty="0"/>
+              <a:t>On peut accepter FN non nul? Mail observé comme SPAM alors qu'on l'a prédit comme BON ? Je sais pas</a:t>
+            </a:r>
+          </a:p>
+          <a:p>
+            <a:r>
+              <a:rPr lang="fr-FR" dirty="0"/>
+              <a:t>On peut accepter FP non nul ? Mail observé comme BON alors qu'on l'a prédit comme SPAM ? Non ! =&gt; FP=0 =&gt; </a:t>
+            </a:r>
+            <a:r>
+              <a:rPr lang="fr-FR" dirty="0" err="1"/>
+              <a:t>Precision</a:t>
+            </a:r>
+            <a:r>
+              <a:rPr lang="fr-FR" dirty="0"/>
+              <a:t> = 1 </a:t>
+            </a:r>
+          </a:p>
+          <a:p>
+            <a:endParaRPr lang="fr-FR" dirty="0"/>
+          </a:p>
+          <a:p>
+            <a:r>
+              <a:rPr lang="fr-FR" dirty="0"/>
+              <a:t>Pour le cancer (=1)</a:t>
+            </a:r>
+          </a:p>
+          <a:p>
+            <a:r>
+              <a:rPr lang="fr-FR" dirty="0"/>
+              <a:t>On se place en TP</a:t>
+            </a:r>
+          </a:p>
+          <a:p>
+            <a:r>
+              <a:rPr lang="fr-FR" dirty="0"/>
+              <a:t>On peut accepter FP non nul?  On n'observe pas de cancer (=0) alors qu'on a prédit cancer ? Je ne sais pas   </a:t>
+            </a:r>
+          </a:p>
+          <a:p>
+            <a:r>
+              <a:rPr lang="fr-FR" dirty="0"/>
+              <a:t>On peut accepter FN non nul? On observe un cancer (=1)        alors qu'on a prédit "pas de cancer" ? Non ! =&gt; FN=0 =&gt; </a:t>
+            </a:r>
+            <a:r>
+              <a:rPr lang="fr-FR" dirty="0" err="1"/>
+              <a:t>Recall</a:t>
+            </a:r>
+            <a:r>
+              <a:rPr lang="fr-FR" dirty="0"/>
+              <a:t> = 1</a:t>
+            </a:r>
+          </a:p>
+          <a:p>
+            <a:endParaRPr lang="fr-FR" dirty="0"/>
+          </a:p>
+          <a:p>
+            <a:r>
+              <a:rPr lang="fr-FR" dirty="0"/>
+              <a:t>Mails identifiés comme BON (=1)</a:t>
+            </a:r>
+          </a:p>
+          <a:p>
+            <a:r>
+              <a:rPr lang="fr-FR" dirty="0"/>
+              <a:t>On se place en TP</a:t>
+            </a:r>
+          </a:p>
+          <a:p>
+            <a:r>
+              <a:rPr lang="fr-FR" dirty="0"/>
+              <a:t>On peut accepter FP non nul ? Mail observé comme SPAM alors qu'on l'a prédit comme BON ?  Je sais pas   </a:t>
+            </a:r>
+          </a:p>
+          <a:p>
+            <a:r>
+              <a:rPr lang="fr-FR" dirty="0"/>
+              <a:t>On peut accepter FN non nul? Mail observé BON                alors qu'on l'a prédit comme SPAM ? Non ! =&gt; FN=0 =&gt; </a:t>
+            </a:r>
+            <a:r>
+              <a:rPr lang="fr-FR" dirty="0" err="1"/>
+              <a:t>Recall</a:t>
+            </a:r>
+            <a:r>
+              <a:rPr lang="fr-FR" dirty="0"/>
+              <a:t> = 1</a:t>
+            </a:r>
+          </a:p>
+          <a:p>
+            <a:endParaRPr lang="fr-FR" dirty="0"/>
+          </a:p>
+          <a:p>
+            <a:endParaRPr lang="fr-FR" dirty="0"/>
           </a:p>
           <a:p>
             <a:endParaRPr lang="fr-FR" dirty="0"/>
@@ -5988,7 +6248,7 @@
           <a:p>
             <a:fld id="{CA52ACDA-CAD7-4952-B2DF-2528E011DCB5}" type="slidenum">
               <a:rPr lang="fr-FR" smtClean="0"/>
-              <a:t>59</a:t>
+              <a:t>51</a:t>
             </a:fld>
             <a:endParaRPr lang="fr-FR"/>
           </a:p>
@@ -5997,7 +6257,7 @@
     </p:spTree>
     <p:extLst>
       <p:ext uri="{BB962C8B-B14F-4D97-AF65-F5344CB8AC3E}">
-        <p14:creationId xmlns:p14="http://schemas.microsoft.com/office/powerpoint/2010/main" val="2069620183"/>
+        <p14:creationId xmlns:p14="http://schemas.microsoft.com/office/powerpoint/2010/main" val="737341901"/>
       </p:ext>
     </p:extLst>
   </p:cSld>
@@ -6154,7 +6414,7 @@
           <a:p>
             <a:fld id="{814EAAF8-3877-4B4B-B2A5-D637106D66A3}" type="datetimeFigureOut">
               <a:rPr lang="fr-FR" smtClean="0"/>
-              <a:t>15/01/2024</a:t>
+              <a:t>16/01/2024</a:t>
             </a:fld>
             <a:endParaRPr lang="fr-FR"/>
           </a:p>
@@ -6352,7 +6612,7 @@
           <a:p>
             <a:fld id="{814EAAF8-3877-4B4B-B2A5-D637106D66A3}" type="datetimeFigureOut">
               <a:rPr lang="fr-FR" smtClean="0"/>
-              <a:t>15/01/2024</a:t>
+              <a:t>16/01/2024</a:t>
             </a:fld>
             <a:endParaRPr lang="fr-FR"/>
           </a:p>
@@ -6560,7 +6820,7 @@
           <a:p>
             <a:fld id="{814EAAF8-3877-4B4B-B2A5-D637106D66A3}" type="datetimeFigureOut">
               <a:rPr lang="fr-FR" smtClean="0"/>
-              <a:t>15/01/2024</a:t>
+              <a:t>16/01/2024</a:t>
             </a:fld>
             <a:endParaRPr lang="fr-FR"/>
           </a:p>
@@ -6758,7 +7018,7 @@
           <a:p>
             <a:fld id="{814EAAF8-3877-4B4B-B2A5-D637106D66A3}" type="datetimeFigureOut">
               <a:rPr lang="fr-FR" smtClean="0"/>
-              <a:t>15/01/2024</a:t>
+              <a:t>16/01/2024</a:t>
             </a:fld>
             <a:endParaRPr lang="fr-FR"/>
           </a:p>
@@ -7033,7 +7293,7 @@
           <a:p>
             <a:fld id="{814EAAF8-3877-4B4B-B2A5-D637106D66A3}" type="datetimeFigureOut">
               <a:rPr lang="fr-FR" smtClean="0"/>
-              <a:t>15/01/2024</a:t>
+              <a:t>16/01/2024</a:t>
             </a:fld>
             <a:endParaRPr lang="fr-FR"/>
           </a:p>
@@ -7298,7 +7558,7 @@
           <a:p>
             <a:fld id="{814EAAF8-3877-4B4B-B2A5-D637106D66A3}" type="datetimeFigureOut">
               <a:rPr lang="fr-FR" smtClean="0"/>
-              <a:t>15/01/2024</a:t>
+              <a:t>16/01/2024</a:t>
             </a:fld>
             <a:endParaRPr lang="fr-FR"/>
           </a:p>
@@ -7710,7 +7970,7 @@
           <a:p>
             <a:fld id="{814EAAF8-3877-4B4B-B2A5-D637106D66A3}" type="datetimeFigureOut">
               <a:rPr lang="fr-FR" smtClean="0"/>
-              <a:t>15/01/2024</a:t>
+              <a:t>16/01/2024</a:t>
             </a:fld>
             <a:endParaRPr lang="fr-FR"/>
           </a:p>
@@ -7851,7 +8111,7 @@
           <a:p>
             <a:fld id="{814EAAF8-3877-4B4B-B2A5-D637106D66A3}" type="datetimeFigureOut">
               <a:rPr lang="fr-FR" smtClean="0"/>
-              <a:t>15/01/2024</a:t>
+              <a:t>16/01/2024</a:t>
             </a:fld>
             <a:endParaRPr lang="fr-FR"/>
           </a:p>
@@ -7964,7 +8224,7 @@
           <a:p>
             <a:fld id="{814EAAF8-3877-4B4B-B2A5-D637106D66A3}" type="datetimeFigureOut">
               <a:rPr lang="fr-FR" smtClean="0"/>
-              <a:t>15/01/2024</a:t>
+              <a:t>16/01/2024</a:t>
             </a:fld>
             <a:endParaRPr lang="fr-FR"/>
           </a:p>
@@ -8275,7 +8535,7 @@
           <a:p>
             <a:fld id="{814EAAF8-3877-4B4B-B2A5-D637106D66A3}" type="datetimeFigureOut">
               <a:rPr lang="fr-FR" smtClean="0"/>
-              <a:t>15/01/2024</a:t>
+              <a:t>16/01/2024</a:t>
             </a:fld>
             <a:endParaRPr lang="fr-FR"/>
           </a:p>
@@ -8563,7 +8823,7 @@
           <a:p>
             <a:fld id="{814EAAF8-3877-4B4B-B2A5-D637106D66A3}" type="datetimeFigureOut">
               <a:rPr lang="fr-FR" smtClean="0"/>
-              <a:t>15/01/2024</a:t>
+              <a:t>16/01/2024</a:t>
             </a:fld>
             <a:endParaRPr lang="fr-FR"/>
           </a:p>
@@ -8804,7 +9064,7 @@
           <a:p>
             <a:fld id="{814EAAF8-3877-4B4B-B2A5-D637106D66A3}" type="datetimeFigureOut">
               <a:rPr lang="fr-FR" smtClean="0"/>
-              <a:t>15/01/2024</a:t>
+              <a:t>16/01/2024</a:t>
             </a:fld>
             <a:endParaRPr lang="fr-FR"/>
           </a:p>
@@ -28908,268 +29168,6 @@
           <a:p>
             <a:r>
               <a:rPr lang="fr-FR" dirty="0"/>
-              <a:t>FAQ</a:t>
-            </a:r>
-          </a:p>
-        </p:txBody>
-      </p:sp>
-      <p:sp>
-        <p:nvSpPr>
-          <p:cNvPr id="3" name="Espace réservé du contenu 2">
-            <a:extLst>
-              <a:ext uri="{FF2B5EF4-FFF2-40B4-BE49-F238E27FC236}">
-                <a16:creationId xmlns:a16="http://schemas.microsoft.com/office/drawing/2014/main" id="{FB2F845B-A441-D492-A6B6-4DC959609C23}"/>
-              </a:ext>
-            </a:extLst>
-          </p:cNvPr>
-          <p:cNvSpPr>
-            <a:spLocks noGrp="1"/>
-          </p:cNvSpPr>
-          <p:nvPr>
-            <p:ph idx="1"/>
-          </p:nvPr>
-        </p:nvSpPr>
-        <p:spPr/>
-        <p:txBody>
-          <a:bodyPr>
-            <a:normAutofit fontScale="77500" lnSpcReduction="20000"/>
-          </a:bodyPr>
-          <a:lstStyle/>
-          <a:p>
-            <a:r>
-              <a:rPr lang="fr-FR" dirty="0"/>
-              <a:t>Pourquoi on fait </a:t>
-            </a:r>
-            <a:r>
-              <a:rPr lang="fr-FR" dirty="0" err="1">
-                <a:latin typeface="Courier New" panose="02070309020205020404" pitchFamily="49" charset="0"/>
-                <a:cs typeface="Courier New" panose="02070309020205020404" pitchFamily="49" charset="0"/>
-              </a:rPr>
-              <a:t>feature_encoder</a:t>
-            </a:r>
-            <a:r>
-              <a:rPr lang="fr-FR" dirty="0"/>
-              <a:t> sur </a:t>
-            </a:r>
-            <a:r>
-              <a:rPr lang="fr-FR" dirty="0" err="1"/>
-              <a:t>X_train</a:t>
-            </a:r>
-            <a:r>
-              <a:rPr lang="fr-FR" dirty="0"/>
-              <a:t> puis sur </a:t>
-            </a:r>
-            <a:r>
-              <a:rPr lang="fr-FR" dirty="0" err="1"/>
-              <a:t>X_test</a:t>
-            </a:r>
-            <a:r>
-              <a:rPr lang="fr-FR" dirty="0"/>
-              <a:t> et pas sur X tout entier avant de splitter?</a:t>
-            </a:r>
-          </a:p>
-          <a:p>
-            <a:pPr lvl="1"/>
-            <a:r>
-              <a:rPr lang="fr-FR" dirty="0"/>
-              <a:t>Si on remplace une valeur manquante par la moyenne on utilise la moyenne de toute la colonne et pas la moyenne de </a:t>
-            </a:r>
-            <a:r>
-              <a:rPr lang="fr-FR" dirty="0" err="1"/>
-              <a:t>X_train</a:t>
-            </a:r>
-            <a:r>
-              <a:rPr lang="fr-FR" dirty="0"/>
-              <a:t> ou de </a:t>
-            </a:r>
-            <a:r>
-              <a:rPr lang="fr-FR" dirty="0" err="1"/>
-              <a:t>X_test</a:t>
-            </a:r>
-            <a:endParaRPr lang="fr-FR" dirty="0"/>
-          </a:p>
-          <a:p>
-            <a:pPr lvl="1"/>
-            <a:r>
-              <a:rPr lang="fr-FR" dirty="0"/>
-              <a:t>On "influence" alors le contenu de </a:t>
-            </a:r>
-            <a:r>
-              <a:rPr lang="fr-FR" dirty="0" err="1"/>
-              <a:t>X_test</a:t>
-            </a:r>
-            <a:r>
-              <a:rPr lang="fr-FR" dirty="0"/>
-              <a:t> avec le contenu de </a:t>
-            </a:r>
-            <a:r>
-              <a:rPr lang="fr-FR" dirty="0" err="1"/>
-              <a:t>X_train</a:t>
-            </a:r>
-            <a:endParaRPr lang="fr-FR" dirty="0"/>
-          </a:p>
-          <a:p>
-            <a:endParaRPr lang="fr-FR" dirty="0"/>
-          </a:p>
-          <a:p>
-            <a:r>
-              <a:rPr lang="fr-FR" dirty="0" err="1">
-                <a:latin typeface="Courier New" panose="02070309020205020404" pitchFamily="49" charset="0"/>
-                <a:cs typeface="Courier New" panose="02070309020205020404" pitchFamily="49" charset="0"/>
-              </a:rPr>
-              <a:t>random_state</a:t>
-            </a:r>
-            <a:r>
-              <a:rPr lang="fr-FR" dirty="0">
-                <a:latin typeface="Courier New" panose="02070309020205020404" pitchFamily="49" charset="0"/>
-                <a:cs typeface="Courier New" panose="02070309020205020404" pitchFamily="49" charset="0"/>
-              </a:rPr>
-              <a:t>=0</a:t>
-            </a:r>
-            <a:r>
-              <a:rPr lang="fr-FR" dirty="0"/>
-              <a:t> </a:t>
-            </a:r>
-          </a:p>
-          <a:p>
-            <a:pPr lvl="1"/>
-            <a:r>
-              <a:rPr lang="fr-FR" dirty="0"/>
-              <a:t>voir </a:t>
-            </a:r>
-            <a:r>
-              <a:rPr lang="fr-FR" dirty="0" err="1"/>
-              <a:t>train_test_split</a:t>
-            </a:r>
-            <a:r>
-              <a:rPr lang="fr-FR" dirty="0"/>
-              <a:t> par ex.</a:t>
-            </a:r>
-          </a:p>
-          <a:p>
-            <a:pPr lvl="1"/>
-            <a:r>
-              <a:rPr lang="fr-FR" dirty="0"/>
-              <a:t>S'assure qu'on aura toujours les mêmes nombres aléatoires générés dans le même ordre.</a:t>
-            </a:r>
-          </a:p>
-          <a:p>
-            <a:pPr lvl="1"/>
-            <a:r>
-              <a:rPr lang="fr-FR" dirty="0"/>
-              <a:t>Permet de comparer les résultats d'un run avec un autre</a:t>
-            </a:r>
-          </a:p>
-          <a:p>
-            <a:endParaRPr lang="fr-FR" dirty="0">
-              <a:latin typeface="Courier New" panose="02070309020205020404" pitchFamily="49" charset="0"/>
-              <a:cs typeface="Courier New" panose="02070309020205020404" pitchFamily="49" charset="0"/>
-            </a:endParaRPr>
-          </a:p>
-          <a:p>
-            <a:r>
-              <a:rPr lang="fr-FR" dirty="0" err="1">
-                <a:latin typeface="Courier New" panose="02070309020205020404" pitchFamily="49" charset="0"/>
-                <a:cs typeface="Courier New" panose="02070309020205020404" pitchFamily="49" charset="0"/>
-              </a:rPr>
-              <a:t>stratify</a:t>
-            </a:r>
-            <a:r>
-              <a:rPr lang="fr-FR" dirty="0">
-                <a:latin typeface="Courier New" panose="02070309020205020404" pitchFamily="49" charset="0"/>
-                <a:cs typeface="Courier New" panose="02070309020205020404" pitchFamily="49" charset="0"/>
-              </a:rPr>
-              <a:t> = y </a:t>
-            </a:r>
-          </a:p>
-          <a:p>
-            <a:pPr lvl="1"/>
-            <a:r>
-              <a:rPr lang="fr-FR" dirty="0"/>
-              <a:t>voir </a:t>
-            </a:r>
-            <a:r>
-              <a:rPr lang="fr-FR" dirty="0" err="1"/>
-              <a:t>train_test_split</a:t>
-            </a:r>
-            <a:r>
-              <a:rPr lang="fr-FR" dirty="0"/>
-              <a:t> par ex.</a:t>
-            </a:r>
-          </a:p>
-          <a:p>
-            <a:pPr lvl="1"/>
-            <a:r>
-              <a:rPr lang="fr-FR" dirty="0"/>
-              <a:t>On veut retrouver dans train et test les mêmes proportions de </a:t>
-            </a:r>
-            <a:r>
-              <a:rPr lang="fr-FR" dirty="0">
-                <a:latin typeface="Courier New" panose="02070309020205020404" pitchFamily="49" charset="0"/>
-                <a:cs typeface="Courier New" panose="02070309020205020404" pitchFamily="49" charset="0"/>
-              </a:rPr>
-              <a:t>y</a:t>
-            </a:r>
-            <a:r>
-              <a:rPr lang="fr-FR" dirty="0"/>
-              <a:t> que dans l'ensemble de départ</a:t>
-            </a:r>
-          </a:p>
-        </p:txBody>
-      </p:sp>
-    </p:spTree>
-    <p:extLst>
-      <p:ext uri="{BB962C8B-B14F-4D97-AF65-F5344CB8AC3E}">
-        <p14:creationId xmlns:p14="http://schemas.microsoft.com/office/powerpoint/2010/main" val="1176226442"/>
-      </p:ext>
-    </p:extLst>
-  </p:cSld>
-  <p:clrMapOvr>
-    <a:masterClrMapping/>
-  </p:clrMapOvr>
-</p:sld>
-</file>
-
-<file path=ppt/slides/slide46.xml><?xml version="1.0" encoding="utf-8"?>
-<p:sld xmlns:a="http://schemas.openxmlformats.org/drawingml/2006/main" xmlns:r="http://schemas.openxmlformats.org/officeDocument/2006/relationships" xmlns:p="http://schemas.openxmlformats.org/presentationml/2006/main">
-  <p:cSld>
-    <p:spTree>
-      <p:nvGrpSpPr>
-        <p:cNvPr id="1" name=""/>
-        <p:cNvGrpSpPr/>
-        <p:nvPr/>
-      </p:nvGrpSpPr>
-      <p:grpSpPr>
-        <a:xfrm>
-          <a:off x="0" y="0"/>
-          <a:ext cx="0" cy="0"/>
-          <a:chOff x="0" y="0"/>
-          <a:chExt cx="0" cy="0"/>
-        </a:xfrm>
-      </p:grpSpPr>
-      <p:sp>
-        <p:nvSpPr>
-          <p:cNvPr id="2" name="Titre 1">
-            <a:extLst>
-              <a:ext uri="{FF2B5EF4-FFF2-40B4-BE49-F238E27FC236}">
-                <a16:creationId xmlns:a16="http://schemas.microsoft.com/office/drawing/2014/main" id="{18E5830E-96ED-9DF4-359F-F1CBFD6C7517}"/>
-              </a:ext>
-            </a:extLst>
-          </p:cNvPr>
-          <p:cNvSpPr>
-            <a:spLocks noGrp="1"/>
-          </p:cNvSpPr>
-          <p:nvPr>
-            <p:ph type="title"/>
-          </p:nvPr>
-        </p:nvSpPr>
-        <p:spPr/>
-        <p:txBody>
-          <a:bodyPr/>
-          <a:lstStyle/>
-          <a:p>
-            <a:r>
-              <a:rPr lang="fr-FR" dirty="0"/>
               <a:t>FAQ </a:t>
             </a:r>
             <a:r>
@@ -30008,6 +30006,288 @@
 </p:sld>
 </file>
 
+<file path=ppt/slides/slide46.xml><?xml version="1.0" encoding="utf-8"?>
+<p:sld xmlns:a="http://schemas.openxmlformats.org/drawingml/2006/main" xmlns:r="http://schemas.openxmlformats.org/officeDocument/2006/relationships" xmlns:p="http://schemas.openxmlformats.org/presentationml/2006/main">
+  <p:cSld>
+    <p:spTree>
+      <p:nvGrpSpPr>
+        <p:cNvPr id="1" name=""/>
+        <p:cNvGrpSpPr/>
+        <p:nvPr/>
+      </p:nvGrpSpPr>
+      <p:grpSpPr>
+        <a:xfrm>
+          <a:off x="0" y="0"/>
+          <a:ext cx="0" cy="0"/>
+          <a:chOff x="0" y="0"/>
+          <a:chExt cx="0" cy="0"/>
+        </a:xfrm>
+      </p:grpSpPr>
+      <p:sp>
+        <p:nvSpPr>
+          <p:cNvPr id="2" name="Titre 1">
+            <a:extLst>
+              <a:ext uri="{FF2B5EF4-FFF2-40B4-BE49-F238E27FC236}">
+                <a16:creationId xmlns:a16="http://schemas.microsoft.com/office/drawing/2014/main" id="{18E5830E-96ED-9DF4-359F-F1CBFD6C7517}"/>
+              </a:ext>
+            </a:extLst>
+          </p:cNvPr>
+          <p:cNvSpPr>
+            <a:spLocks noGrp="1"/>
+          </p:cNvSpPr>
+          <p:nvPr>
+            <p:ph type="title"/>
+          </p:nvPr>
+        </p:nvSpPr>
+        <p:spPr/>
+        <p:txBody>
+          <a:bodyPr/>
+          <a:lstStyle/>
+          <a:p>
+            <a:r>
+              <a:rPr lang="fr-FR" dirty="0"/>
+              <a:t>FAQ</a:t>
+            </a:r>
+          </a:p>
+        </p:txBody>
+      </p:sp>
+      <p:sp>
+        <p:nvSpPr>
+          <p:cNvPr id="3" name="Espace réservé du contenu 2">
+            <a:extLst>
+              <a:ext uri="{FF2B5EF4-FFF2-40B4-BE49-F238E27FC236}">
+                <a16:creationId xmlns:a16="http://schemas.microsoft.com/office/drawing/2014/main" id="{FB2F845B-A441-D492-A6B6-4DC959609C23}"/>
+              </a:ext>
+            </a:extLst>
+          </p:cNvPr>
+          <p:cNvSpPr>
+            <a:spLocks noGrp="1"/>
+          </p:cNvSpPr>
+          <p:nvPr>
+            <p:ph idx="1"/>
+          </p:nvPr>
+        </p:nvSpPr>
+        <p:spPr/>
+        <p:txBody>
+          <a:bodyPr>
+            <a:normAutofit fontScale="77500" lnSpcReduction="20000"/>
+          </a:bodyPr>
+          <a:lstStyle/>
+          <a:p>
+            <a:r>
+              <a:rPr lang="fr-FR" dirty="0"/>
+              <a:t>Pourquoi on fait </a:t>
+            </a:r>
+            <a:r>
+              <a:rPr lang="fr-FR" dirty="0" err="1">
+                <a:latin typeface="Courier New" panose="02070309020205020404" pitchFamily="49" charset="0"/>
+                <a:cs typeface="Courier New" panose="02070309020205020404" pitchFamily="49" charset="0"/>
+              </a:rPr>
+              <a:t>feature_encoder</a:t>
+            </a:r>
+            <a:r>
+              <a:rPr lang="fr-FR" dirty="0"/>
+              <a:t> sur </a:t>
+            </a:r>
+            <a:r>
+              <a:rPr lang="fr-FR" dirty="0" err="1"/>
+              <a:t>X_train</a:t>
+            </a:r>
+            <a:r>
+              <a:rPr lang="fr-FR" dirty="0"/>
+              <a:t> puis sur </a:t>
+            </a:r>
+            <a:r>
+              <a:rPr lang="fr-FR" dirty="0" err="1"/>
+              <a:t>X_test</a:t>
+            </a:r>
+            <a:r>
+              <a:rPr lang="fr-FR" dirty="0"/>
+              <a:t> et pas sur X tout entier avant de splitter?</a:t>
+            </a:r>
+          </a:p>
+          <a:p>
+            <a:pPr lvl="1"/>
+            <a:r>
+              <a:rPr lang="fr-FR" dirty="0"/>
+              <a:t>Si on remplace une valeur manquante par la moyenne on utilise la moyenne de toute la colonne et pas la moyenne de </a:t>
+            </a:r>
+            <a:r>
+              <a:rPr lang="fr-FR" dirty="0" err="1"/>
+              <a:t>X_train</a:t>
+            </a:r>
+            <a:r>
+              <a:rPr lang="fr-FR" dirty="0"/>
+              <a:t> ou de </a:t>
+            </a:r>
+            <a:r>
+              <a:rPr lang="fr-FR" dirty="0" err="1"/>
+              <a:t>X_test</a:t>
+            </a:r>
+            <a:endParaRPr lang="fr-FR" dirty="0"/>
+          </a:p>
+          <a:p>
+            <a:pPr lvl="1"/>
+            <a:r>
+              <a:rPr lang="fr-FR" dirty="0"/>
+              <a:t>On "influence" alors le contenu de </a:t>
+            </a:r>
+            <a:r>
+              <a:rPr lang="fr-FR" dirty="0" err="1"/>
+              <a:t>X_test</a:t>
+            </a:r>
+            <a:r>
+              <a:rPr lang="fr-FR" dirty="0"/>
+              <a:t> avec le contenu de </a:t>
+            </a:r>
+            <a:r>
+              <a:rPr lang="fr-FR" dirty="0" err="1"/>
+              <a:t>X_train</a:t>
+            </a:r>
+            <a:endParaRPr lang="fr-FR" dirty="0"/>
+          </a:p>
+          <a:p>
+            <a:endParaRPr lang="fr-FR" dirty="0"/>
+          </a:p>
+          <a:p>
+            <a:r>
+              <a:rPr lang="fr-FR" dirty="0" err="1">
+                <a:latin typeface="Courier New" panose="02070309020205020404" pitchFamily="49" charset="0"/>
+                <a:cs typeface="Courier New" panose="02070309020205020404" pitchFamily="49" charset="0"/>
+              </a:rPr>
+              <a:t>random_state</a:t>
+            </a:r>
+            <a:r>
+              <a:rPr lang="fr-FR" dirty="0">
+                <a:latin typeface="Courier New" panose="02070309020205020404" pitchFamily="49" charset="0"/>
+                <a:cs typeface="Courier New" panose="02070309020205020404" pitchFamily="49" charset="0"/>
+              </a:rPr>
+              <a:t>=0</a:t>
+            </a:r>
+            <a:r>
+              <a:rPr lang="fr-FR" dirty="0"/>
+              <a:t> </a:t>
+            </a:r>
+          </a:p>
+          <a:p>
+            <a:pPr lvl="1"/>
+            <a:r>
+              <a:rPr lang="fr-FR" dirty="0"/>
+              <a:t>voir </a:t>
+            </a:r>
+            <a:r>
+              <a:rPr lang="fr-FR" dirty="0" err="1">
+                <a:latin typeface="Courier New" panose="02070309020205020404" pitchFamily="49" charset="0"/>
+                <a:cs typeface="Courier New" panose="02070309020205020404" pitchFamily="49" charset="0"/>
+              </a:rPr>
+              <a:t>train_test_split</a:t>
+            </a:r>
+            <a:r>
+              <a:rPr lang="fr-FR" dirty="0">
+                <a:latin typeface="Courier New" panose="02070309020205020404" pitchFamily="49" charset="0"/>
+                <a:cs typeface="Courier New" panose="02070309020205020404" pitchFamily="49" charset="0"/>
+              </a:rPr>
+              <a:t>()</a:t>
+            </a:r>
+            <a:r>
+              <a:rPr lang="fr-FR" dirty="0"/>
+              <a:t> par ex.</a:t>
+            </a:r>
+          </a:p>
+          <a:p>
+            <a:pPr lvl="1"/>
+            <a:r>
+              <a:rPr lang="fr-FR" dirty="0"/>
+              <a:t>S'assure qu'on aura toujours les mêmes nombres aléatoires générés dans le même ordre.</a:t>
+            </a:r>
+          </a:p>
+          <a:p>
+            <a:pPr lvl="1"/>
+            <a:r>
+              <a:rPr lang="fr-FR" dirty="0"/>
+              <a:t>Permet de comparer les résultats d'un run avec un autre</a:t>
+            </a:r>
+          </a:p>
+          <a:p>
+            <a:endParaRPr lang="fr-FR" dirty="0">
+              <a:latin typeface="Courier New" panose="02070309020205020404" pitchFamily="49" charset="0"/>
+              <a:cs typeface="Courier New" panose="02070309020205020404" pitchFamily="49" charset="0"/>
+            </a:endParaRPr>
+          </a:p>
+          <a:p>
+            <a:r>
+              <a:rPr lang="fr-FR" dirty="0" err="1">
+                <a:latin typeface="Courier New" panose="02070309020205020404" pitchFamily="49" charset="0"/>
+                <a:cs typeface="Courier New" panose="02070309020205020404" pitchFamily="49" charset="0"/>
+              </a:rPr>
+              <a:t>stratify</a:t>
+            </a:r>
+            <a:r>
+              <a:rPr lang="fr-FR" dirty="0">
+                <a:latin typeface="Courier New" panose="02070309020205020404" pitchFamily="49" charset="0"/>
+                <a:cs typeface="Courier New" panose="02070309020205020404" pitchFamily="49" charset="0"/>
+              </a:rPr>
+              <a:t> = y </a:t>
+            </a:r>
+          </a:p>
+          <a:p>
+            <a:pPr lvl="1"/>
+            <a:r>
+              <a:rPr lang="fr-FR" dirty="0"/>
+              <a:t>voir </a:t>
+            </a:r>
+            <a:r>
+              <a:rPr lang="fr-FR" sz="2500" dirty="0" err="1">
+                <a:latin typeface="Courier New" panose="02070309020205020404" pitchFamily="49" charset="0"/>
+                <a:cs typeface="Courier New" panose="02070309020205020404" pitchFamily="49" charset="0"/>
+              </a:rPr>
+              <a:t>train_test_split</a:t>
+            </a:r>
+            <a:r>
+              <a:rPr lang="fr-FR" sz="2500" dirty="0">
+                <a:latin typeface="Courier New" panose="02070309020205020404" pitchFamily="49" charset="0"/>
+                <a:cs typeface="Courier New" panose="02070309020205020404" pitchFamily="49" charset="0"/>
+              </a:rPr>
+              <a:t>() </a:t>
+            </a:r>
+            <a:r>
+              <a:rPr lang="fr-FR" dirty="0"/>
+              <a:t>par ex.</a:t>
+            </a:r>
+          </a:p>
+          <a:p>
+            <a:pPr lvl="1"/>
+            <a:r>
+              <a:rPr lang="fr-FR" dirty="0"/>
+              <a:t>On veut retrouver dans les train et test sets les mêmes proportions de </a:t>
+            </a:r>
+            <a:r>
+              <a:rPr lang="fr-FR" dirty="0">
+                <a:latin typeface="Courier New" panose="02070309020205020404" pitchFamily="49" charset="0"/>
+                <a:cs typeface="Courier New" panose="02070309020205020404" pitchFamily="49" charset="0"/>
+              </a:rPr>
+              <a:t>y</a:t>
+            </a:r>
+            <a:r>
+              <a:rPr lang="fr-FR" dirty="0"/>
+              <a:t> que dans l'ensemble de départ</a:t>
+            </a:r>
+          </a:p>
+        </p:txBody>
+      </p:sp>
+    </p:spTree>
+    <p:extLst>
+      <p:ext uri="{BB962C8B-B14F-4D97-AF65-F5344CB8AC3E}">
+        <p14:creationId xmlns:p14="http://schemas.microsoft.com/office/powerpoint/2010/main" val="1176226442"/>
+      </p:ext>
+    </p:extLst>
+  </p:cSld>
+  <p:clrMapOvr>
+    <a:masterClrMapping/>
+  </p:clrMapOvr>
+</p:sld>
+</file>
+
 <file path=ppt/slides/slide47.xml><?xml version="1.0" encoding="utf-8"?>
 <p:sld xmlns:a="http://schemas.openxmlformats.org/drawingml/2006/main" xmlns:r="http://schemas.openxmlformats.org/officeDocument/2006/relationships" xmlns:p="http://schemas.openxmlformats.org/presentationml/2006/main">
   <p:cSld>
@@ -31211,8 +31491,16 @@
           <a:lstStyle/>
           <a:p>
             <a:r>
+              <a:rPr lang="en-US" dirty="0">
+                <a:highlight>
+                  <a:srgbClr val="00FF00"/>
+                </a:highlight>
+              </a:rPr>
+              <a:t>Pre</a:t>
+            </a:r>
+            <a:r>
               <a:rPr lang="en-US" dirty="0"/>
-              <a:t>Precision :</a:t>
+              <a:t>cision :</a:t>
             </a:r>
           </a:p>
           <a:p>
@@ -31230,20 +31518,92 @@
               <a:t> des </a:t>
             </a:r>
             <a:r>
+              <a:rPr lang="en-US" dirty="0" err="1">
+                <a:highlight>
+                  <a:srgbClr val="00FF00"/>
+                </a:highlight>
+              </a:rPr>
+              <a:t>pré</a:t>
+            </a:r>
+            <a:r>
               <a:rPr lang="en-US" dirty="0" err="1"/>
-              <a:t>prédictions</a:t>
+              <a:t>dictions</a:t>
             </a:r>
             <a:endParaRPr lang="en-US" dirty="0"/>
           </a:p>
           <a:p>
             <a:pPr lvl="1"/>
             <a:r>
-              <a:rPr lang="en-US" dirty="0"/>
+              <a:rPr lang="en-US" i="1" dirty="0">
+                <a:highlight>
+                  <a:srgbClr val="FFFF00"/>
+                </a:highlight>
+              </a:rPr>
               <a:t>De </a:t>
             </a:r>
             <a:r>
+              <a:rPr lang="en-US" i="1" dirty="0" err="1">
+                <a:highlight>
+                  <a:srgbClr val="FFFF00"/>
+                </a:highlight>
+              </a:rPr>
+              <a:t>tous</a:t>
+            </a:r>
+            <a:r>
+              <a:rPr lang="en-US" i="1" dirty="0">
+                <a:highlight>
+                  <a:srgbClr val="FFFF00"/>
+                </a:highlight>
+              </a:rPr>
+              <a:t> </a:t>
+            </a:r>
+            <a:r>
+              <a:rPr lang="en-US" i="1" dirty="0" err="1">
+                <a:highlight>
+                  <a:srgbClr val="FFFF00"/>
+                </a:highlight>
+              </a:rPr>
+              <a:t>ceux</a:t>
+            </a:r>
+            <a:r>
+              <a:rPr lang="en-US" i="1" dirty="0">
+                <a:highlight>
+                  <a:srgbClr val="FFFF00"/>
+                </a:highlight>
+              </a:rPr>
+              <a:t> </a:t>
+            </a:r>
+            <a:r>
+              <a:rPr lang="en-US" i="1" dirty="0" err="1">
+                <a:highlight>
+                  <a:srgbClr val="FFFF00"/>
+                </a:highlight>
+              </a:rPr>
+              <a:t>qu'on</a:t>
+            </a:r>
+            <a:r>
+              <a:rPr lang="en-US" i="1" dirty="0">
+                <a:highlight>
+                  <a:srgbClr val="FFFF00"/>
+                </a:highlight>
+              </a:rPr>
+              <a:t> </a:t>
+            </a:r>
+            <a:r>
+              <a:rPr lang="en-US" i="1" dirty="0" err="1">
+                <a:highlight>
+                  <a:srgbClr val="FFFF00"/>
+                </a:highlight>
+              </a:rPr>
+              <a:t>prédit</a:t>
+            </a:r>
+            <a:r>
+              <a:rPr lang="en-US" i="1" dirty="0"/>
+              <a:t> </a:t>
+            </a:r>
+            <a:r>
               <a:rPr lang="en-US" dirty="0" err="1"/>
-              <a:t>tous</a:t>
+              <a:t>comme</a:t>
             </a:r>
             <a:r>
               <a:rPr lang="en-US" dirty="0"/>
@@ -31251,19 +31611,11 @@
             </a:r>
             <a:r>
               <a:rPr lang="en-US" dirty="0" err="1"/>
-              <a:t>ceux</a:t>
+              <a:t>cancéreux</a:t>
             </a:r>
             <a:r>
               <a:rPr lang="en-US" dirty="0"/>
-              <a:t> à qui on a </a:t>
-            </a:r>
-            <a:r>
-              <a:rPr lang="en-US" dirty="0" err="1"/>
-              <a:t>prédit</a:t>
-            </a:r>
-            <a:r>
-              <a:rPr lang="en-US" dirty="0"/>
-              <a:t> le cancer </a:t>
+              <a:t>, </a:t>
             </a:r>
             <a:r>
               <a:rPr lang="en-US" dirty="0" err="1"/>
@@ -31297,12 +31649,12 @@
               <a:t>TP/(TP+FP) : </a:t>
             </a:r>
             <a:r>
-              <a:rPr lang="fr-FR" dirty="0"/>
-              <a:t>Right </a:t>
+              <a:rPr lang="en-US" dirty="0" err="1"/>
+              <a:t>colonne</a:t>
             </a:r>
             <a:r>
               <a:rPr lang="en-US" dirty="0"/>
-              <a:t>column</a:t>
+              <a:t> de droite</a:t>
             </a:r>
           </a:p>
           <a:p>
@@ -31337,12 +31689,64 @@
           <a:p>
             <a:pPr lvl="1"/>
             <a:r>
-              <a:rPr lang="en-US" dirty="0"/>
+              <a:rPr lang="en-US" i="1" dirty="0">
+                <a:highlight>
+                  <a:srgbClr val="FFFF00"/>
+                </a:highlight>
+              </a:rPr>
               <a:t>De </a:t>
             </a:r>
             <a:r>
+              <a:rPr lang="en-US" i="1" dirty="0" err="1">
+                <a:highlight>
+                  <a:srgbClr val="FFFF00"/>
+                </a:highlight>
+              </a:rPr>
+              <a:t>tous</a:t>
+            </a:r>
+            <a:r>
+              <a:rPr lang="en-US" i="1" dirty="0">
+                <a:highlight>
+                  <a:srgbClr val="FFFF00"/>
+                </a:highlight>
+              </a:rPr>
+              <a:t> </a:t>
+            </a:r>
+            <a:r>
+              <a:rPr lang="en-US" i="1" dirty="0" err="1">
+                <a:highlight>
+                  <a:srgbClr val="FFFF00"/>
+                </a:highlight>
+              </a:rPr>
+              <a:t>ceux</a:t>
+            </a:r>
+            <a:r>
+              <a:rPr lang="en-US" i="1" dirty="0">
+                <a:highlight>
+                  <a:srgbClr val="FFFF00"/>
+                </a:highlight>
+              </a:rPr>
+              <a:t> </a:t>
+            </a:r>
+            <a:r>
+              <a:rPr lang="en-US" i="1" dirty="0" err="1">
+                <a:highlight>
+                  <a:srgbClr val="FFFF00"/>
+                </a:highlight>
+              </a:rPr>
+              <a:t>qu'on</a:t>
+            </a:r>
+            <a:r>
+              <a:rPr lang="en-US" i="1" dirty="0">
+                <a:highlight>
+                  <a:srgbClr val="FFFF00"/>
+                </a:highlight>
+              </a:rPr>
+              <a:t> observe </a:t>
+            </a:r>
+            <a:r>
               <a:rPr lang="en-US" dirty="0" err="1"/>
-              <a:t>tous</a:t>
+              <a:t>comme</a:t>
             </a:r>
             <a:r>
               <a:rPr lang="en-US" dirty="0"/>
@@ -31350,7 +31754,15 @@
             </a:r>
             <a:r>
               <a:rPr lang="en-US" dirty="0" err="1"/>
-              <a:t>ceux</a:t>
+              <a:t>cancéreux</a:t>
+            </a:r>
+            <a:r>
+              <a:rPr lang="en-US" dirty="0"/>
+              <a:t>, </a:t>
+            </a:r>
+            <a:r>
+              <a:rPr lang="en-US" dirty="0" err="1"/>
+              <a:t>combien</a:t>
             </a:r>
             <a:r>
               <a:rPr lang="en-US" dirty="0"/>
@@ -31358,15 +31770,7 @@
             </a:r>
             <a:r>
               <a:rPr lang="en-US" dirty="0" err="1"/>
-              <a:t>qu'on</a:t>
-            </a:r>
-            <a:r>
-              <a:rPr lang="en-US" dirty="0"/>
-              <a:t> observe </a:t>
-            </a:r>
-            <a:r>
-              <a:rPr lang="en-US" dirty="0" err="1"/>
-              <a:t>comme</a:t>
+              <a:t>ont</a:t>
             </a:r>
             <a:r>
               <a:rPr lang="en-US" dirty="0"/>
@@ -31374,30 +31778,6 @@
             </a:r>
             <a:r>
               <a:rPr lang="en-US" dirty="0" err="1"/>
-              <a:t>cancéreux</a:t>
-            </a:r>
-            <a:r>
-              <a:rPr lang="en-US" dirty="0"/>
-              <a:t>, </a:t>
-            </a:r>
-            <a:r>
-              <a:rPr lang="en-US" dirty="0" err="1"/>
-              <a:t>combien</a:t>
-            </a:r>
-            <a:r>
-              <a:rPr lang="en-US" dirty="0"/>
-              <a:t> </a:t>
-            </a:r>
-            <a:r>
-              <a:rPr lang="en-US" dirty="0" err="1"/>
-              <a:t>ont</a:t>
-            </a:r>
-            <a:r>
-              <a:rPr lang="en-US" dirty="0"/>
-              <a:t> </a:t>
-            </a:r>
-            <a:r>
-              <a:rPr lang="en-US" dirty="0" err="1"/>
               <a:t>été</a:t>
             </a:r>
             <a:r>
@@ -31417,7 +31797,15 @@
             <a:pPr lvl="1"/>
             <a:r>
               <a:rPr lang="en-US" dirty="0"/>
-              <a:t>TP/(TP+FN) : Bottom line</a:t>
+              <a:t>TP/(TP+FN) : </a:t>
+            </a:r>
+            <a:r>
+              <a:rPr lang="en-US" dirty="0" err="1"/>
+              <a:t>ligne</a:t>
+            </a:r>
+            <a:r>
+              <a:rPr lang="en-US" dirty="0"/>
+              <a:t> du bas</a:t>
             </a:r>
           </a:p>
           <a:p>
@@ -31438,7 +31826,15 @@
             <a:pPr lvl="1"/>
             <a:r>
               <a:rPr lang="en-US" dirty="0"/>
-              <a:t>Harmonic average between Recall &amp; Precision </a:t>
+              <a:t>Moyenne </a:t>
+            </a:r>
+            <a:r>
+              <a:rPr lang="en-US" dirty="0" err="1"/>
+              <a:t>harmonique</a:t>
+            </a:r>
+            <a:r>
+              <a:rPr lang="en-US" dirty="0"/>
+              <a:t> entre Recall &amp; Precision </a:t>
             </a:r>
           </a:p>
           <a:p>
@@ -31463,7 +31859,15 @@
             </a:r>
             <a:r>
               <a:rPr lang="fr-FR" dirty="0"/>
-              <a:t>Diag over Total</a:t>
+              <a:t> </a:t>
+            </a:r>
+            <a:r>
+              <a:rPr lang="fr-FR" dirty="0" err="1"/>
+              <a:t>diag</a:t>
+            </a:r>
+            <a:r>
+              <a:rPr lang="fr-FR" dirty="0"/>
+              <a:t> over Total</a:t>
             </a:r>
           </a:p>
         </p:txBody>
@@ -31762,11 +32166,11 @@
           <a:lstStyle/>
           <a:p>
             <a:r>
-              <a:rPr lang="fr-FR" sz="1400" dirty="0">
+              <a:rPr lang="fr-FR" sz="1400" i="1" dirty="0">
                 <a:latin typeface="Times New Roman" panose="02020603050405020304" pitchFamily="18" charset="0"/>
                 <a:cs typeface="Times New Roman" panose="02020603050405020304" pitchFamily="18" charset="0"/>
               </a:rPr>
-              <a:t>Depuis l'extérieur, regarde la ligne ou la colonne du 1</a:t>
+              <a:t>On compare TP au total de la ligne ou de la colonne.</a:t>
             </a:r>
           </a:p>
         </p:txBody>
@@ -31972,6 +32376,715 @@
                       </p:childTnLst>
                     </p:cTn>
                   </p:par>
+                  <p:par>
+                    <p:cTn id="7" fill="hold">
+                      <p:stCondLst>
+                        <p:cond delay="indefinite"/>
+                      </p:stCondLst>
+                      <p:childTnLst>
+                        <p:par>
+                          <p:cTn id="8" fill="hold">
+                            <p:stCondLst>
+                              <p:cond delay="0"/>
+                            </p:stCondLst>
+                            <p:childTnLst>
+                              <p:par>
+                                <p:cTn id="9" presetID="10" presetClass="entr" presetSubtype="0" fill="hold" grpId="0" nodeType="clickEffect">
+                                  <p:stCondLst>
+                                    <p:cond delay="0"/>
+                                  </p:stCondLst>
+                                  <p:childTnLst>
+                                    <p:set>
+                                      <p:cBhvr>
+                                        <p:cTn id="10" dur="1" fill="hold">
+                                          <p:stCondLst>
+                                            <p:cond delay="0"/>
+                                          </p:stCondLst>
+                                        </p:cTn>
+                                        <p:tgtEl>
+                                          <p:spTgt spid="14"/>
+                                        </p:tgtEl>
+                                        <p:attrNameLst>
+                                          <p:attrName>style.visibility</p:attrName>
+                                        </p:attrNameLst>
+                                      </p:cBhvr>
+                                      <p:to>
+                                        <p:strVal val="visible"/>
+                                      </p:to>
+                                    </p:set>
+                                    <p:animEffect transition="in" filter="fade">
+                                      <p:cBhvr>
+                                        <p:cTn id="11" dur="500"/>
+                                        <p:tgtEl>
+                                          <p:spTgt spid="14"/>
+                                        </p:tgtEl>
+                                      </p:cBhvr>
+                                    </p:animEffect>
+                                  </p:childTnLst>
+                                </p:cTn>
+                              </p:par>
+                            </p:childTnLst>
+                          </p:cTn>
+                        </p:par>
+                      </p:childTnLst>
+                    </p:cTn>
+                  </p:par>
+                  <p:par>
+                    <p:cTn id="12" fill="hold">
+                      <p:stCondLst>
+                        <p:cond delay="indefinite"/>
+                      </p:stCondLst>
+                      <p:childTnLst>
+                        <p:par>
+                          <p:cTn id="13" fill="hold">
+                            <p:stCondLst>
+                              <p:cond delay="0"/>
+                            </p:stCondLst>
+                            <p:childTnLst>
+                              <p:par>
+                                <p:cTn id="14" presetID="10" presetClass="entr" presetSubtype="0" fill="hold" grpId="0" nodeType="clickEffect">
+                                  <p:stCondLst>
+                                    <p:cond delay="0"/>
+                                  </p:stCondLst>
+                                  <p:childTnLst>
+                                    <p:set>
+                                      <p:cBhvr>
+                                        <p:cTn id="15" dur="1" fill="hold">
+                                          <p:stCondLst>
+                                            <p:cond delay="0"/>
+                                          </p:stCondLst>
+                                        </p:cTn>
+                                        <p:tgtEl>
+                                          <p:spTgt spid="10"/>
+                                        </p:tgtEl>
+                                        <p:attrNameLst>
+                                          <p:attrName>style.visibility</p:attrName>
+                                        </p:attrNameLst>
+                                      </p:cBhvr>
+                                      <p:to>
+                                        <p:strVal val="visible"/>
+                                      </p:to>
+                                    </p:set>
+                                    <p:animEffect transition="in" filter="fade">
+                                      <p:cBhvr>
+                                        <p:cTn id="16" dur="500"/>
+                                        <p:tgtEl>
+                                          <p:spTgt spid="10"/>
+                                        </p:tgtEl>
+                                      </p:cBhvr>
+                                    </p:animEffect>
+                                  </p:childTnLst>
+                                </p:cTn>
+                              </p:par>
+                            </p:childTnLst>
+                          </p:cTn>
+                        </p:par>
+                      </p:childTnLst>
+                    </p:cTn>
+                  </p:par>
+                  <p:par>
+                    <p:cTn id="17" fill="hold">
+                      <p:stCondLst>
+                        <p:cond delay="indefinite"/>
+                      </p:stCondLst>
+                      <p:childTnLst>
+                        <p:par>
+                          <p:cTn id="18" fill="hold">
+                            <p:stCondLst>
+                              <p:cond delay="0"/>
+                            </p:stCondLst>
+                            <p:childTnLst>
+                              <p:par>
+                                <p:cTn id="19" presetID="10" presetClass="entr" presetSubtype="0" fill="hold" grpId="0" nodeType="clickEffect">
+                                  <p:stCondLst>
+                                    <p:cond delay="0"/>
+                                  </p:stCondLst>
+                                  <p:childTnLst>
+                                    <p:set>
+                                      <p:cBhvr>
+                                        <p:cTn id="20" dur="1" fill="hold">
+                                          <p:stCondLst>
+                                            <p:cond delay="0"/>
+                                          </p:stCondLst>
+                                        </p:cTn>
+                                        <p:tgtEl>
+                                          <p:spTgt spid="12"/>
+                                        </p:tgtEl>
+                                        <p:attrNameLst>
+                                          <p:attrName>style.visibility</p:attrName>
+                                        </p:attrNameLst>
+                                      </p:cBhvr>
+                                      <p:to>
+                                        <p:strVal val="visible"/>
+                                      </p:to>
+                                    </p:set>
+                                    <p:animEffect transition="in" filter="fade">
+                                      <p:cBhvr>
+                                        <p:cTn id="21" dur="500"/>
+                                        <p:tgtEl>
+                                          <p:spTgt spid="12"/>
+                                        </p:tgtEl>
+                                      </p:cBhvr>
+                                    </p:animEffect>
+                                  </p:childTnLst>
+                                </p:cTn>
+                              </p:par>
+                            </p:childTnLst>
+                          </p:cTn>
+                        </p:par>
+                      </p:childTnLst>
+                    </p:cTn>
+                  </p:par>
+                  <p:par>
+                    <p:cTn id="22" fill="hold">
+                      <p:stCondLst>
+                        <p:cond delay="indefinite"/>
+                      </p:stCondLst>
+                      <p:childTnLst>
+                        <p:par>
+                          <p:cTn id="23" fill="hold">
+                            <p:stCondLst>
+                              <p:cond delay="0"/>
+                            </p:stCondLst>
+                            <p:childTnLst>
+                              <p:par>
+                                <p:cTn id="24" presetID="22" presetClass="entr" presetSubtype="4" fill="hold" grpId="0" nodeType="clickEffect">
+                                  <p:stCondLst>
+                                    <p:cond delay="0"/>
+                                  </p:stCondLst>
+                                  <p:childTnLst>
+                                    <p:set>
+                                      <p:cBhvr>
+                                        <p:cTn id="25" dur="1" fill="hold">
+                                          <p:stCondLst>
+                                            <p:cond delay="0"/>
+                                          </p:stCondLst>
+                                        </p:cTn>
+                                        <p:tgtEl>
+                                          <p:spTgt spid="13"/>
+                                        </p:tgtEl>
+                                        <p:attrNameLst>
+                                          <p:attrName>style.visibility</p:attrName>
+                                        </p:attrNameLst>
+                                      </p:cBhvr>
+                                      <p:to>
+                                        <p:strVal val="visible"/>
+                                      </p:to>
+                                    </p:set>
+                                    <p:animEffect transition="in" filter="wipe(down)">
+                                      <p:cBhvr>
+                                        <p:cTn id="26" dur="500"/>
+                                        <p:tgtEl>
+                                          <p:spTgt spid="13"/>
+                                        </p:tgtEl>
+                                      </p:cBhvr>
+                                    </p:animEffect>
+                                  </p:childTnLst>
+                                </p:cTn>
+                              </p:par>
+                            </p:childTnLst>
+                          </p:cTn>
+                        </p:par>
+                      </p:childTnLst>
+                    </p:cTn>
+                  </p:par>
+                  <p:par>
+                    <p:cTn id="27" fill="hold">
+                      <p:stCondLst>
+                        <p:cond delay="indefinite"/>
+                      </p:stCondLst>
+                      <p:childTnLst>
+                        <p:par>
+                          <p:cTn id="28" fill="hold">
+                            <p:stCondLst>
+                              <p:cond delay="0"/>
+                            </p:stCondLst>
+                            <p:childTnLst>
+                              <p:par>
+                                <p:cTn id="29" presetID="22" presetClass="entr" presetSubtype="8" fill="hold" grpId="0" nodeType="clickEffect">
+                                  <p:stCondLst>
+                                    <p:cond delay="0"/>
+                                  </p:stCondLst>
+                                  <p:childTnLst>
+                                    <p:set>
+                                      <p:cBhvr>
+                                        <p:cTn id="30" dur="1" fill="hold">
+                                          <p:stCondLst>
+                                            <p:cond delay="0"/>
+                                          </p:stCondLst>
+                                        </p:cTn>
+                                        <p:tgtEl>
+                                          <p:spTgt spid="11"/>
+                                        </p:tgtEl>
+                                        <p:attrNameLst>
+                                          <p:attrName>style.visibility</p:attrName>
+                                        </p:attrNameLst>
+                                      </p:cBhvr>
+                                      <p:to>
+                                        <p:strVal val="visible"/>
+                                      </p:to>
+                                    </p:set>
+                                    <p:animEffect transition="in" filter="wipe(left)">
+                                      <p:cBhvr>
+                                        <p:cTn id="31" dur="500"/>
+                                        <p:tgtEl>
+                                          <p:spTgt spid="11"/>
+                                        </p:tgtEl>
+                                      </p:cBhvr>
+                                    </p:animEffect>
+                                  </p:childTnLst>
+                                </p:cTn>
+                              </p:par>
+                            </p:childTnLst>
+                          </p:cTn>
+                        </p:par>
+                      </p:childTnLst>
+                    </p:cTn>
+                  </p:par>
+                  <p:par>
+                    <p:cTn id="32" fill="hold">
+                      <p:stCondLst>
+                        <p:cond delay="indefinite"/>
+                      </p:stCondLst>
+                      <p:childTnLst>
+                        <p:par>
+                          <p:cTn id="33" fill="hold">
+                            <p:stCondLst>
+                              <p:cond delay="0"/>
+                            </p:stCondLst>
+                            <p:childTnLst>
+                              <p:par>
+                                <p:cTn id="34" presetID="1" presetClass="entr" presetSubtype="0" fill="hold" grpId="0" nodeType="clickEffect">
+                                  <p:stCondLst>
+                                    <p:cond delay="0"/>
+                                  </p:stCondLst>
+                                  <p:childTnLst>
+                                    <p:set>
+                                      <p:cBhvr>
+                                        <p:cTn id="35" dur="1" fill="hold">
+                                          <p:stCondLst>
+                                            <p:cond delay="0"/>
+                                          </p:stCondLst>
+                                        </p:cTn>
+                                        <p:tgtEl>
+                                          <p:spTgt spid="3">
+                                            <p:txEl>
+                                              <p:pRg st="0" end="0"/>
+                                            </p:txEl>
+                                          </p:spTgt>
+                                        </p:tgtEl>
+                                        <p:attrNameLst>
+                                          <p:attrName>style.visibility</p:attrName>
+                                        </p:attrNameLst>
+                                      </p:cBhvr>
+                                      <p:to>
+                                        <p:strVal val="visible"/>
+                                      </p:to>
+                                    </p:set>
+                                  </p:childTnLst>
+                                </p:cTn>
+                              </p:par>
+                              <p:par>
+                                <p:cTn id="36" presetID="1" presetClass="entr" presetSubtype="0" fill="hold" grpId="0" nodeType="withEffect">
+                                  <p:stCondLst>
+                                    <p:cond delay="0"/>
+                                  </p:stCondLst>
+                                  <p:childTnLst>
+                                    <p:set>
+                                      <p:cBhvr>
+                                        <p:cTn id="37" dur="1" fill="hold">
+                                          <p:stCondLst>
+                                            <p:cond delay="0"/>
+                                          </p:stCondLst>
+                                        </p:cTn>
+                                        <p:tgtEl>
+                                          <p:spTgt spid="3">
+                                            <p:txEl>
+                                              <p:pRg st="1" end="1"/>
+                                            </p:txEl>
+                                          </p:spTgt>
+                                        </p:tgtEl>
+                                        <p:attrNameLst>
+                                          <p:attrName>style.visibility</p:attrName>
+                                        </p:attrNameLst>
+                                      </p:cBhvr>
+                                      <p:to>
+                                        <p:strVal val="visible"/>
+                                      </p:to>
+                                    </p:set>
+                                  </p:childTnLst>
+                                </p:cTn>
+                              </p:par>
+                              <p:par>
+                                <p:cTn id="38" presetID="1" presetClass="entr" presetSubtype="0" fill="hold" grpId="0" nodeType="withEffect">
+                                  <p:stCondLst>
+                                    <p:cond delay="0"/>
+                                  </p:stCondLst>
+                                  <p:childTnLst>
+                                    <p:set>
+                                      <p:cBhvr>
+                                        <p:cTn id="39" dur="1" fill="hold">
+                                          <p:stCondLst>
+                                            <p:cond delay="0"/>
+                                          </p:stCondLst>
+                                        </p:cTn>
+                                        <p:tgtEl>
+                                          <p:spTgt spid="3">
+                                            <p:txEl>
+                                              <p:pRg st="2" end="2"/>
+                                            </p:txEl>
+                                          </p:spTgt>
+                                        </p:tgtEl>
+                                        <p:attrNameLst>
+                                          <p:attrName>style.visibility</p:attrName>
+                                        </p:attrNameLst>
+                                      </p:cBhvr>
+                                      <p:to>
+                                        <p:strVal val="visible"/>
+                                      </p:to>
+                                    </p:set>
+                                  </p:childTnLst>
+                                </p:cTn>
+                              </p:par>
+                              <p:par>
+                                <p:cTn id="40" presetID="1" presetClass="entr" presetSubtype="0" fill="hold" grpId="0" nodeType="withEffect">
+                                  <p:stCondLst>
+                                    <p:cond delay="0"/>
+                                  </p:stCondLst>
+                                  <p:childTnLst>
+                                    <p:set>
+                                      <p:cBhvr>
+                                        <p:cTn id="41" dur="1" fill="hold">
+                                          <p:stCondLst>
+                                            <p:cond delay="0"/>
+                                          </p:stCondLst>
+                                        </p:cTn>
+                                        <p:tgtEl>
+                                          <p:spTgt spid="3">
+                                            <p:txEl>
+                                              <p:pRg st="3" end="3"/>
+                                            </p:txEl>
+                                          </p:spTgt>
+                                        </p:tgtEl>
+                                        <p:attrNameLst>
+                                          <p:attrName>style.visibility</p:attrName>
+                                        </p:attrNameLst>
+                                      </p:cBhvr>
+                                      <p:to>
+                                        <p:strVal val="visible"/>
+                                      </p:to>
+                                    </p:set>
+                                  </p:childTnLst>
+                                </p:cTn>
+                              </p:par>
+                            </p:childTnLst>
+                          </p:cTn>
+                        </p:par>
+                      </p:childTnLst>
+                    </p:cTn>
+                  </p:par>
+                  <p:par>
+                    <p:cTn id="42" fill="hold">
+                      <p:stCondLst>
+                        <p:cond delay="indefinite"/>
+                      </p:stCondLst>
+                      <p:childTnLst>
+                        <p:par>
+                          <p:cTn id="43" fill="hold">
+                            <p:stCondLst>
+                              <p:cond delay="0"/>
+                            </p:stCondLst>
+                            <p:childTnLst>
+                              <p:par>
+                                <p:cTn id="44" presetID="1" presetClass="entr" presetSubtype="0" fill="hold" grpId="0" nodeType="clickEffect">
+                                  <p:stCondLst>
+                                    <p:cond delay="0"/>
+                                  </p:stCondLst>
+                                  <p:childTnLst>
+                                    <p:set>
+                                      <p:cBhvr>
+                                        <p:cTn id="45" dur="1" fill="hold">
+                                          <p:stCondLst>
+                                            <p:cond delay="0"/>
+                                          </p:stCondLst>
+                                        </p:cTn>
+                                        <p:tgtEl>
+                                          <p:spTgt spid="3">
+                                            <p:txEl>
+                                              <p:pRg st="4" end="4"/>
+                                            </p:txEl>
+                                          </p:spTgt>
+                                        </p:tgtEl>
+                                        <p:attrNameLst>
+                                          <p:attrName>style.visibility</p:attrName>
+                                        </p:attrNameLst>
+                                      </p:cBhvr>
+                                      <p:to>
+                                        <p:strVal val="visible"/>
+                                      </p:to>
+                                    </p:set>
+                                  </p:childTnLst>
+                                </p:cTn>
+                              </p:par>
+                              <p:par>
+                                <p:cTn id="46" presetID="1" presetClass="entr" presetSubtype="0" fill="hold" grpId="0" nodeType="withEffect">
+                                  <p:stCondLst>
+                                    <p:cond delay="0"/>
+                                  </p:stCondLst>
+                                  <p:childTnLst>
+                                    <p:set>
+                                      <p:cBhvr>
+                                        <p:cTn id="47" dur="1" fill="hold">
+                                          <p:stCondLst>
+                                            <p:cond delay="0"/>
+                                          </p:stCondLst>
+                                        </p:cTn>
+                                        <p:tgtEl>
+                                          <p:spTgt spid="3">
+                                            <p:txEl>
+                                              <p:pRg st="5" end="5"/>
+                                            </p:txEl>
+                                          </p:spTgt>
+                                        </p:tgtEl>
+                                        <p:attrNameLst>
+                                          <p:attrName>style.visibility</p:attrName>
+                                        </p:attrNameLst>
+                                      </p:cBhvr>
+                                      <p:to>
+                                        <p:strVal val="visible"/>
+                                      </p:to>
+                                    </p:set>
+                                  </p:childTnLst>
+                                </p:cTn>
+                              </p:par>
+                              <p:par>
+                                <p:cTn id="48" presetID="1" presetClass="entr" presetSubtype="0" fill="hold" grpId="0" nodeType="withEffect">
+                                  <p:stCondLst>
+                                    <p:cond delay="0"/>
+                                  </p:stCondLst>
+                                  <p:childTnLst>
+                                    <p:set>
+                                      <p:cBhvr>
+                                        <p:cTn id="49" dur="1" fill="hold">
+                                          <p:stCondLst>
+                                            <p:cond delay="0"/>
+                                          </p:stCondLst>
+                                        </p:cTn>
+                                        <p:tgtEl>
+                                          <p:spTgt spid="3">
+                                            <p:txEl>
+                                              <p:pRg st="6" end="6"/>
+                                            </p:txEl>
+                                          </p:spTgt>
+                                        </p:tgtEl>
+                                        <p:attrNameLst>
+                                          <p:attrName>style.visibility</p:attrName>
+                                        </p:attrNameLst>
+                                      </p:cBhvr>
+                                      <p:to>
+                                        <p:strVal val="visible"/>
+                                      </p:to>
+                                    </p:set>
+                                  </p:childTnLst>
+                                </p:cTn>
+                              </p:par>
+                              <p:par>
+                                <p:cTn id="50" presetID="1" presetClass="entr" presetSubtype="0" fill="hold" grpId="0" nodeType="withEffect">
+                                  <p:stCondLst>
+                                    <p:cond delay="0"/>
+                                  </p:stCondLst>
+                                  <p:childTnLst>
+                                    <p:set>
+                                      <p:cBhvr>
+                                        <p:cTn id="51" dur="1" fill="hold">
+                                          <p:stCondLst>
+                                            <p:cond delay="0"/>
+                                          </p:stCondLst>
+                                        </p:cTn>
+                                        <p:tgtEl>
+                                          <p:spTgt spid="3">
+                                            <p:txEl>
+                                              <p:pRg st="7" end="7"/>
+                                            </p:txEl>
+                                          </p:spTgt>
+                                        </p:tgtEl>
+                                        <p:attrNameLst>
+                                          <p:attrName>style.visibility</p:attrName>
+                                        </p:attrNameLst>
+                                      </p:cBhvr>
+                                      <p:to>
+                                        <p:strVal val="visible"/>
+                                      </p:to>
+                                    </p:set>
+                                  </p:childTnLst>
+                                </p:cTn>
+                              </p:par>
+                            </p:childTnLst>
+                          </p:cTn>
+                        </p:par>
+                      </p:childTnLst>
+                    </p:cTn>
+                  </p:par>
+                  <p:par>
+                    <p:cTn id="52" fill="hold">
+                      <p:stCondLst>
+                        <p:cond delay="indefinite"/>
+                      </p:stCondLst>
+                      <p:childTnLst>
+                        <p:par>
+                          <p:cTn id="53" fill="hold">
+                            <p:stCondLst>
+                              <p:cond delay="0"/>
+                            </p:stCondLst>
+                            <p:childTnLst>
+                              <p:par>
+                                <p:cTn id="54" presetID="1" presetClass="entr" presetSubtype="0" fill="hold" grpId="0" nodeType="clickEffect">
+                                  <p:stCondLst>
+                                    <p:cond delay="0"/>
+                                  </p:stCondLst>
+                                  <p:childTnLst>
+                                    <p:set>
+                                      <p:cBhvr>
+                                        <p:cTn id="55" dur="1" fill="hold">
+                                          <p:stCondLst>
+                                            <p:cond delay="0"/>
+                                          </p:stCondLst>
+                                        </p:cTn>
+                                        <p:tgtEl>
+                                          <p:spTgt spid="3">
+                                            <p:txEl>
+                                              <p:pRg st="8" end="8"/>
+                                            </p:txEl>
+                                          </p:spTgt>
+                                        </p:tgtEl>
+                                        <p:attrNameLst>
+                                          <p:attrName>style.visibility</p:attrName>
+                                        </p:attrNameLst>
+                                      </p:cBhvr>
+                                      <p:to>
+                                        <p:strVal val="visible"/>
+                                      </p:to>
+                                    </p:set>
+                                  </p:childTnLst>
+                                </p:cTn>
+                              </p:par>
+                              <p:par>
+                                <p:cTn id="56" presetID="1" presetClass="entr" presetSubtype="0" fill="hold" grpId="0" nodeType="withEffect">
+                                  <p:stCondLst>
+                                    <p:cond delay="0"/>
+                                  </p:stCondLst>
+                                  <p:childTnLst>
+                                    <p:set>
+                                      <p:cBhvr>
+                                        <p:cTn id="57" dur="1" fill="hold">
+                                          <p:stCondLst>
+                                            <p:cond delay="0"/>
+                                          </p:stCondLst>
+                                        </p:cTn>
+                                        <p:tgtEl>
+                                          <p:spTgt spid="3">
+                                            <p:txEl>
+                                              <p:pRg st="9" end="9"/>
+                                            </p:txEl>
+                                          </p:spTgt>
+                                        </p:tgtEl>
+                                        <p:attrNameLst>
+                                          <p:attrName>style.visibility</p:attrName>
+                                        </p:attrNameLst>
+                                      </p:cBhvr>
+                                      <p:to>
+                                        <p:strVal val="visible"/>
+                                      </p:to>
+                                    </p:set>
+                                  </p:childTnLst>
+                                </p:cTn>
+                              </p:par>
+                            </p:childTnLst>
+                          </p:cTn>
+                        </p:par>
+                      </p:childTnLst>
+                    </p:cTn>
+                  </p:par>
+                  <p:par>
+                    <p:cTn id="58" fill="hold">
+                      <p:stCondLst>
+                        <p:cond delay="indefinite"/>
+                      </p:stCondLst>
+                      <p:childTnLst>
+                        <p:par>
+                          <p:cTn id="59" fill="hold">
+                            <p:stCondLst>
+                              <p:cond delay="0"/>
+                            </p:stCondLst>
+                            <p:childTnLst>
+                              <p:par>
+                                <p:cTn id="60" presetID="1" presetClass="entr" presetSubtype="0" fill="hold" grpId="0" nodeType="clickEffect">
+                                  <p:stCondLst>
+                                    <p:cond delay="0"/>
+                                  </p:stCondLst>
+                                  <p:childTnLst>
+                                    <p:set>
+                                      <p:cBhvr>
+                                        <p:cTn id="61" dur="1" fill="hold">
+                                          <p:stCondLst>
+                                            <p:cond delay="0"/>
+                                          </p:stCondLst>
+                                        </p:cTn>
+                                        <p:tgtEl>
+                                          <p:spTgt spid="3">
+                                            <p:txEl>
+                                              <p:pRg st="10" end="10"/>
+                                            </p:txEl>
+                                          </p:spTgt>
+                                        </p:tgtEl>
+                                        <p:attrNameLst>
+                                          <p:attrName>style.visibility</p:attrName>
+                                        </p:attrNameLst>
+                                      </p:cBhvr>
+                                      <p:to>
+                                        <p:strVal val="visible"/>
+                                      </p:to>
+                                    </p:set>
+                                  </p:childTnLst>
+                                </p:cTn>
+                              </p:par>
+                              <p:par>
+                                <p:cTn id="62" presetID="1" presetClass="entr" presetSubtype="0" fill="hold" grpId="0" nodeType="withEffect">
+                                  <p:stCondLst>
+                                    <p:cond delay="0"/>
+                                  </p:stCondLst>
+                                  <p:childTnLst>
+                                    <p:set>
+                                      <p:cBhvr>
+                                        <p:cTn id="63" dur="1" fill="hold">
+                                          <p:stCondLst>
+                                            <p:cond delay="0"/>
+                                          </p:stCondLst>
+                                        </p:cTn>
+                                        <p:tgtEl>
+                                          <p:spTgt spid="3">
+                                            <p:txEl>
+                                              <p:pRg st="11" end="11"/>
+                                            </p:txEl>
+                                          </p:spTgt>
+                                        </p:tgtEl>
+                                        <p:attrNameLst>
+                                          <p:attrName>style.visibility</p:attrName>
+                                        </p:attrNameLst>
+                                      </p:cBhvr>
+                                      <p:to>
+                                        <p:strVal val="visible"/>
+                                      </p:to>
+                                    </p:set>
+                                  </p:childTnLst>
+                                </p:cTn>
+                              </p:par>
+                            </p:childTnLst>
+                          </p:cTn>
+                        </p:par>
+                      </p:childTnLst>
+                    </p:cTn>
+                  </p:par>
                 </p:childTnLst>
               </p:cTn>
               <p:prevCondLst>
@@ -31994,7 +33107,13 @@
       </p:par>
     </p:tnLst>
     <p:bldLst>
+      <p:bldP spid="3" grpId="0" build="p"/>
+      <p:bldP spid="11" grpId="0" animBg="1"/>
+      <p:bldP spid="13" grpId="0" animBg="1"/>
+      <p:bldP spid="12" grpId="0" animBg="1"/>
       <p:bldP spid="4" grpId="0" animBg="1"/>
+      <p:bldP spid="10" grpId="0" animBg="1"/>
+      <p:bldP spid="14" grpId="0" animBg="1"/>
     </p:bldLst>
   </p:timing>
 </p:sld>
@@ -32038,7 +33157,10 @@
           <a:bodyPr/>
           <a:lstStyle/>
           <a:p>
-            <a:endParaRPr lang="fr-FR"/>
+            <a:r>
+              <a:rPr lang="fr-FR" dirty="0"/>
+              <a:t>Exemples</a:t>
+            </a:r>
           </a:p>
         </p:txBody>
       </p:sp>
@@ -32058,9 +33180,16 @@
             <p:ph idx="1"/>
           </p:nvPr>
         </p:nvSpPr>
-        <p:spPr/>
+        <p:spPr>
+          <a:xfrm>
+            <a:off x="838200" y="1825624"/>
+            <a:ext cx="10515600" cy="5032375"/>
+          </a:xfrm>
+        </p:spPr>
         <p:txBody>
-          <a:bodyPr/>
+          <a:bodyPr>
+            <a:normAutofit/>
+          </a:bodyPr>
           <a:lstStyle/>
           <a:p>
             <a:pPr marL="0" marR="0" indent="0">
@@ -32077,91 +33206,131 @@
                 <a:effectLst/>
                 <a:latin typeface="Courier New" panose="02070309020205020404" pitchFamily="49" charset="0"/>
               </a:rPr>
-              <a:t>Fraude carte bancaire</a:t>
-            </a:r>
-          </a:p>
-          <a:p>
-            <a:pPr marL="457200" lvl="1">
+              <a:t>Carte bancaire identifiée comme fausse (=1)</a:t>
+            </a:r>
+          </a:p>
+          <a:p>
+            <a:pPr marL="0" marR="0" indent="0">
+              <a:spcBef>
+                <a:spcPts val="0"/>
+              </a:spcBef>
+              <a:spcAft>
+                <a:spcPts val="0"/>
+              </a:spcAft>
+              <a:buNone/>
+            </a:pPr>
+            <a:r>
+              <a:rPr lang="fr-FR" sz="1800" dirty="0">
+                <a:effectLst/>
+                <a:latin typeface="Courier New" panose="02070309020205020404" pitchFamily="49" charset="0"/>
+              </a:rPr>
+              <a:t>On se place en TP </a:t>
+            </a:r>
+          </a:p>
+          <a:p>
+            <a:pPr marL="0" marR="0" indent="0">
+              <a:spcBef>
+                <a:spcPts val="0"/>
+              </a:spcBef>
+              <a:spcAft>
+                <a:spcPts val="0"/>
+              </a:spcAft>
+              <a:buNone/>
+            </a:pPr>
+            <a:r>
+              <a:rPr lang="fr-FR" sz="1800" dirty="0">
+                <a:effectLst/>
+                <a:latin typeface="Courier New" panose="02070309020205020404" pitchFamily="49" charset="0"/>
+              </a:rPr>
+              <a:t>On peut accepter FP non nul? </a:t>
+            </a:r>
+          </a:p>
+          <a:p>
+            <a:pPr>
               <a:spcBef>
                 <a:spcPts val="0"/>
               </a:spcBef>
             </a:pPr>
             <a:r>
-              <a:rPr lang="fr-FR" sz="1400" dirty="0">
+              <a:rPr lang="fr-FR" sz="1800" dirty="0">
                 <a:effectLst/>
                 <a:latin typeface="Courier New" panose="02070309020205020404" pitchFamily="49" charset="0"/>
               </a:rPr>
-              <a:t>On ne veut pas manquer une fausse carte</a:t>
-            </a:r>
-          </a:p>
-          <a:p>
-            <a:pPr marL="457200" lvl="1">
+              <a:t>Carte observée vraie alors qu'on a prédit fausse? </a:t>
+            </a:r>
+          </a:p>
+          <a:p>
+            <a:pPr>
               <a:spcBef>
                 <a:spcPts val="0"/>
               </a:spcBef>
             </a:pPr>
             <a:r>
-              <a:rPr lang="fr-FR" sz="1400" dirty="0">
+              <a:rPr lang="fr-FR" sz="1800" dirty="0">
                 <a:effectLst/>
                 <a:latin typeface="Courier New" panose="02070309020205020404" pitchFamily="49" charset="0"/>
               </a:rPr>
-              <a:t>Donc on veut un Faux </a:t>
-            </a:r>
-            <a:r>
-              <a:rPr lang="fr-FR" sz="1400" dirty="0" err="1">
+              <a:t>Je ne sais pas</a:t>
+            </a:r>
+          </a:p>
+          <a:p>
+            <a:pPr marL="0" marR="0" indent="0">
+              <a:spcBef>
+                <a:spcPts val="0"/>
+              </a:spcBef>
+              <a:spcAft>
+                <a:spcPts val="0"/>
+              </a:spcAft>
+              <a:buNone/>
+            </a:pPr>
+            <a:r>
+              <a:rPr lang="fr-FR" sz="1800" dirty="0">
                 <a:effectLst/>
                 <a:latin typeface="Courier New" panose="02070309020205020404" pitchFamily="49" charset="0"/>
               </a:rPr>
-              <a:t>Negatif</a:t>
-            </a:r>
-            <a:r>
-              <a:rPr lang="fr-FR" sz="1400" dirty="0">
-                <a:effectLst/>
-                <a:latin typeface="Courier New" panose="02070309020205020404" pitchFamily="49" charset="0"/>
-              </a:rPr>
-              <a:t> bas</a:t>
-            </a:r>
-          </a:p>
-          <a:p>
-            <a:pPr marL="457200" lvl="1">
+              <a:t>On peut accepter FN non nul? </a:t>
+            </a:r>
+          </a:p>
+          <a:p>
+            <a:pPr>
               <a:spcBef>
                 <a:spcPts val="0"/>
               </a:spcBef>
             </a:pPr>
             <a:r>
-              <a:rPr lang="fr-FR" sz="1400" dirty="0" err="1">
+              <a:rPr lang="fr-FR" sz="1800" dirty="0">
                 <a:effectLst/>
                 <a:latin typeface="Courier New" panose="02070309020205020404" pitchFamily="49" charset="0"/>
               </a:rPr>
-              <a:t>Recall</a:t>
-            </a:r>
-            <a:r>
-              <a:rPr lang="fr-FR" sz="1400" dirty="0">
-                <a:effectLst/>
-                <a:latin typeface="Courier New" panose="02070309020205020404" pitchFamily="49" charset="0"/>
-              </a:rPr>
-              <a:t>    doit être proche de 1</a:t>
-            </a:r>
-          </a:p>
-          <a:p>
-            <a:pPr marL="457200" lvl="1">
+              <a:t>Carte observée fausse alors qu'on a prédit vraie? </a:t>
+            </a:r>
+          </a:p>
+          <a:p>
+            <a:pPr>
               <a:spcBef>
                 <a:spcPts val="0"/>
               </a:spcBef>
             </a:pPr>
             <a:r>
-              <a:rPr lang="fr-FR" sz="1400" dirty="0" err="1">
+              <a:rPr lang="fr-FR" sz="1800" dirty="0">
                 <a:effectLst/>
                 <a:latin typeface="Courier New" panose="02070309020205020404" pitchFamily="49" charset="0"/>
               </a:rPr>
-              <a:t>Precision</a:t>
-            </a:r>
-            <a:r>
-              <a:rPr lang="fr-FR" sz="1400" dirty="0">
+              <a:t>Non ! =&gt; FN=0 =&gt; </a:t>
+            </a:r>
+            <a:r>
+              <a:rPr lang="fr-FR" sz="1800" dirty="0" err="1">
                 <a:effectLst/>
                 <a:latin typeface="Courier New" panose="02070309020205020404" pitchFamily="49" charset="0"/>
               </a:rPr>
-              <a:t> peut être moyen </a:t>
+              <a:t>Recall</a:t>
+            </a:r>
+            <a:r>
+              <a:rPr lang="fr-FR" sz="1800" dirty="0">
+                <a:effectLst/>
+                <a:latin typeface="Courier New" panose="02070309020205020404" pitchFamily="49" charset="0"/>
+              </a:rPr>
+              <a:t> =1</a:t>
             </a:r>
           </a:p>
           <a:p>
@@ -32208,6 +33377,7 @@
               <a:buNone/>
             </a:pPr>
             <a:endParaRPr lang="fr-FR" sz="1800" dirty="0">
+              <a:effectLst/>
               <a:latin typeface="Courier New" panose="02070309020205020404" pitchFamily="49" charset="0"/>
             </a:endParaRPr>
           </a:p>
@@ -32221,10 +33391,13 @@
               </a:spcAft>
               <a:buNone/>
             </a:pPr>
-            <a:endParaRPr lang="fr-FR" sz="1800" dirty="0">
-              <a:effectLst/>
-              <a:latin typeface="Courier New" panose="02070309020205020404" pitchFamily="49" charset="0"/>
-            </a:endParaRPr>
+            <a:r>
+              <a:rPr lang="fr-FR" sz="1800" dirty="0">
+                <a:effectLst/>
+                <a:latin typeface="Courier New" panose="02070309020205020404" pitchFamily="49" charset="0"/>
+              </a:rPr>
+              <a:t>Mails identifiés comme SPAM (=1)</a:t>
+            </a:r>
           </a:p>
           <a:p>
             <a:pPr marL="0" marR="0" indent="0">
@@ -32241,77 +33414,113 @@
                 <a:effectLst/>
                 <a:latin typeface="Courier New" panose="02070309020205020404" pitchFamily="49" charset="0"/>
               </a:rPr>
-              <a:t>Spam</a:t>
-            </a:r>
-          </a:p>
-          <a:p>
-            <a:pPr marL="457200" lvl="1">
+              <a:t>On se place en TP</a:t>
+            </a:r>
+          </a:p>
+          <a:p>
+            <a:pPr marL="0" marR="0" indent="0">
+              <a:spcBef>
+                <a:spcPts val="0"/>
+              </a:spcBef>
+              <a:spcAft>
+                <a:spcPts val="0"/>
+              </a:spcAft>
+              <a:buNone/>
+            </a:pPr>
+            <a:r>
+              <a:rPr lang="fr-FR" sz="1800" dirty="0">
+                <a:effectLst/>
+                <a:latin typeface="Courier New" panose="02070309020205020404" pitchFamily="49" charset="0"/>
+              </a:rPr>
+              <a:t>On peut accepter FN non nul? </a:t>
+            </a:r>
+          </a:p>
+          <a:p>
+            <a:pPr>
               <a:spcBef>
                 <a:spcPts val="0"/>
               </a:spcBef>
             </a:pPr>
             <a:r>
-              <a:rPr lang="fr-FR" sz="1400" dirty="0">
+              <a:rPr lang="fr-FR" sz="1800" dirty="0">
                 <a:effectLst/>
                 <a:latin typeface="Courier New" panose="02070309020205020404" pitchFamily="49" charset="0"/>
               </a:rPr>
-              <a:t>On ne veut pas de vrai mail classé en spam</a:t>
-            </a:r>
-          </a:p>
-          <a:p>
-            <a:pPr marL="457200" lvl="1">
+              <a:t>Mail observé comme SPAM alors qu'on l'a prédit comme BON? </a:t>
+            </a:r>
+          </a:p>
+          <a:p>
+            <a:pPr>
               <a:spcBef>
                 <a:spcPts val="0"/>
               </a:spcBef>
             </a:pPr>
             <a:r>
-              <a:rPr lang="fr-FR" sz="1400" dirty="0">
+              <a:rPr lang="fr-FR" sz="1800" dirty="0">
                 <a:effectLst/>
                 <a:latin typeface="Courier New" panose="02070309020205020404" pitchFamily="49" charset="0"/>
               </a:rPr>
-              <a:t>Donc on veut un Faux Positif bas</a:t>
-            </a:r>
-          </a:p>
-          <a:p>
-            <a:pPr marL="457200" lvl="1">
+              <a:t>Je ne sais pas</a:t>
+            </a:r>
+          </a:p>
+          <a:p>
+            <a:pPr marL="0" marR="0" indent="0">
+              <a:spcBef>
+                <a:spcPts val="0"/>
+              </a:spcBef>
+              <a:spcAft>
+                <a:spcPts val="0"/>
+              </a:spcAft>
+              <a:buNone/>
+            </a:pPr>
+            <a:r>
+              <a:rPr lang="fr-FR" sz="1800" dirty="0">
+                <a:effectLst/>
+                <a:latin typeface="Courier New" panose="02070309020205020404" pitchFamily="49" charset="0"/>
+              </a:rPr>
+              <a:t>On peut accepter FP non nul? </a:t>
+            </a:r>
+          </a:p>
+          <a:p>
+            <a:pPr>
               <a:spcBef>
                 <a:spcPts val="0"/>
               </a:spcBef>
             </a:pPr>
             <a:r>
-              <a:rPr lang="fr-FR" sz="1400" dirty="0" err="1">
+              <a:rPr lang="fr-FR" sz="1800" dirty="0">
                 <a:effectLst/>
                 <a:latin typeface="Courier New" panose="02070309020205020404" pitchFamily="49" charset="0"/>
               </a:rPr>
-              <a:t>Recall</a:t>
-            </a:r>
-            <a:r>
-              <a:rPr lang="fr-FR" sz="1400" dirty="0">
-                <a:effectLst/>
-                <a:latin typeface="Courier New" panose="02070309020205020404" pitchFamily="49" charset="0"/>
-              </a:rPr>
-              <a:t>    peut être moyen</a:t>
-            </a:r>
-          </a:p>
-          <a:p>
-            <a:pPr marL="457200" lvl="1">
+              <a:t>Mail observé comme BON alors qu'on l'a prédit comme SPAM? </a:t>
+            </a:r>
+          </a:p>
+          <a:p>
+            <a:pPr>
               <a:spcBef>
                 <a:spcPts val="0"/>
               </a:spcBef>
             </a:pPr>
             <a:r>
-              <a:rPr lang="fr-FR" sz="1400" dirty="0" err="1">
+              <a:rPr lang="fr-FR" sz="1800" dirty="0">
                 <a:effectLst/>
                 <a:latin typeface="Courier New" panose="02070309020205020404" pitchFamily="49" charset="0"/>
               </a:rPr>
-              <a:t>Precision</a:t>
-            </a:r>
-            <a:r>
-              <a:rPr lang="fr-FR" sz="1400" dirty="0">
+              <a:t>Non ! =&gt; FP=0 =&gt; </a:t>
+            </a:r>
+            <a:r>
+              <a:rPr lang="fr-FR" sz="1800" dirty="0" err="1">
                 <a:effectLst/>
                 <a:latin typeface="Courier New" panose="02070309020205020404" pitchFamily="49" charset="0"/>
               </a:rPr>
-              <a:t> doit être proche de 1 </a:t>
+              <a:t>Precision</a:t>
+            </a:r>
+            <a:r>
+              <a:rPr lang="fr-FR" sz="1800" dirty="0">
+                <a:effectLst/>
+                <a:latin typeface="Courier New" panose="02070309020205020404" pitchFamily="49" charset="0"/>
+              </a:rPr>
+              <a:t> = 1 </a:t>
             </a:r>
           </a:p>
           <a:p>
@@ -32319,12 +33528,41 @@
           </a:p>
         </p:txBody>
       </p:sp>
+      <p:pic>
+        <p:nvPicPr>
+          <p:cNvPr id="6" name="Image 5">
+            <a:extLst>
+              <a:ext uri="{FF2B5EF4-FFF2-40B4-BE49-F238E27FC236}">
+                <a16:creationId xmlns:a16="http://schemas.microsoft.com/office/drawing/2014/main" id="{16232193-5BE7-0ACA-60D2-87BC5AE0EB8A}"/>
+              </a:ext>
+            </a:extLst>
+          </p:cNvPr>
+          <p:cNvPicPr>
+            <a:picLocks noChangeAspect="1"/>
+          </p:cNvPicPr>
+          <p:nvPr/>
+        </p:nvPicPr>
+        <p:blipFill rotWithShape="1">
+          <a:blip r:embed="rId3"/>
+          <a:srcRect r="12822"/>
+          <a:stretch/>
+        </p:blipFill>
+        <p:spPr>
+          <a:xfrm>
+            <a:off x="8706499" y="2143612"/>
+            <a:ext cx="2945088" cy="3041509"/>
+          </a:xfrm>
+          <a:prstGeom prst="rect">
+            <a:avLst/>
+          </a:prstGeom>
+        </p:spPr>
+      </p:pic>
       <p:sp>
         <p:nvSpPr>
-          <p:cNvPr id="4" name="ZoneTexte 3">
+          <p:cNvPr id="7" name="ZoneTexte 6">
             <a:extLst>
               <a:ext uri="{FF2B5EF4-FFF2-40B4-BE49-F238E27FC236}">
-                <a16:creationId xmlns:a16="http://schemas.microsoft.com/office/drawing/2014/main" id="{BC769971-6696-B68B-7A7E-C22BD1307536}"/>
+                <a16:creationId xmlns:a16="http://schemas.microsoft.com/office/drawing/2014/main" id="{903BB74F-E6CB-B1E7-21B5-F9FC5A4F9262}"/>
               </a:ext>
             </a:extLst>
           </p:cNvPr>
@@ -32333,8 +33571,8 @@
         </p:nvSpPr>
         <p:spPr>
           <a:xfrm>
-            <a:off x="7419717" y="4598058"/>
-            <a:ext cx="1563248" cy="646331"/>
+            <a:off x="10977568" y="4285899"/>
+            <a:ext cx="415498" cy="369332"/>
           </a:xfrm>
           <a:prstGeom prst="rect">
             <a:avLst/>
@@ -32347,38 +33585,24 @@
           </a:bodyPr>
           <a:lstStyle/>
           <a:p>
-            <a:pPr algn="ctr"/>
-            <a:r>
-              <a:rPr lang="fr-FR" sz="1800" dirty="0" err="1">
-                <a:effectLst/>
-                <a:latin typeface="Courier New" panose="02070309020205020404" pitchFamily="49" charset="0"/>
-              </a:rPr>
-              <a:t>Precision</a:t>
-            </a:r>
-            <a:endParaRPr lang="fr-FR" sz="1800" dirty="0">
-              <a:effectLst/>
-              <a:latin typeface="Courier New" panose="02070309020205020404" pitchFamily="49" charset="0"/>
-            </a:endParaRPr>
-          </a:p>
-          <a:p>
-            <a:pPr algn="ctr"/>
-            <a:r>
-              <a:rPr lang="fr-FR" sz="1800" dirty="0">
-                <a:effectLst/>
-                <a:latin typeface="Courier New" panose="02070309020205020404" pitchFamily="49" charset="0"/>
-              </a:rPr>
-              <a:t>TP/(TP+FP)</a:t>
-            </a:r>
-            <a:endParaRPr lang="fr-FR" dirty="0"/>
+            <a:r>
+              <a:rPr lang="fr-FR" dirty="0">
+                <a:solidFill>
+                  <a:schemeClr val="bg1"/>
+                </a:solidFill>
+                <a:latin typeface="Impact" panose="020B0806030902050204" pitchFamily="34" charset="0"/>
+              </a:rPr>
+              <a:t>TP</a:t>
+            </a:r>
           </a:p>
         </p:txBody>
       </p:sp>
       <p:sp>
         <p:nvSpPr>
-          <p:cNvPr id="5" name="ZoneTexte 4">
+          <p:cNvPr id="8" name="ZoneTexte 7">
             <a:extLst>
               <a:ext uri="{FF2B5EF4-FFF2-40B4-BE49-F238E27FC236}">
-                <a16:creationId xmlns:a16="http://schemas.microsoft.com/office/drawing/2014/main" id="{6722959C-02DD-0821-1CC0-81C189230146}"/>
+                <a16:creationId xmlns:a16="http://schemas.microsoft.com/office/drawing/2014/main" id="{B151808F-66C2-A29F-B517-2E77CB35EA0D}"/>
               </a:ext>
             </a:extLst>
           </p:cNvPr>
@@ -32387,8 +33611,8 @@
         </p:nvSpPr>
         <p:spPr>
           <a:xfrm>
-            <a:off x="7586119" y="2441648"/>
-            <a:ext cx="1563248" cy="646331"/>
+            <a:off x="9440479" y="3047902"/>
+            <a:ext cx="415498" cy="369332"/>
           </a:xfrm>
           <a:prstGeom prst="rect">
             <a:avLst/>
@@ -32401,32 +33625,275 @@
           </a:bodyPr>
           <a:lstStyle/>
           <a:p>
+            <a:r>
+              <a:rPr lang="fr-FR" dirty="0">
+                <a:latin typeface="Impact" panose="020B0806030902050204" pitchFamily="34" charset="0"/>
+              </a:rPr>
+              <a:t>TN</a:t>
+            </a:r>
+          </a:p>
+        </p:txBody>
+      </p:sp>
+      <p:sp>
+        <p:nvSpPr>
+          <p:cNvPr id="9" name="ZoneTexte 8">
+            <a:extLst>
+              <a:ext uri="{FF2B5EF4-FFF2-40B4-BE49-F238E27FC236}">
+                <a16:creationId xmlns:a16="http://schemas.microsoft.com/office/drawing/2014/main" id="{2A182E55-D27E-DCE7-C0D2-AD7A05844F32}"/>
+              </a:ext>
+            </a:extLst>
+          </p:cNvPr>
+          <p:cNvSpPr txBox="1"/>
+          <p:nvPr/>
+        </p:nvSpPr>
+        <p:spPr>
+          <a:xfrm>
+            <a:off x="10944534" y="3150242"/>
+            <a:ext cx="391454" cy="369332"/>
+          </a:xfrm>
+          <a:prstGeom prst="rect">
+            <a:avLst/>
+          </a:prstGeom>
+          <a:noFill/>
+        </p:spPr>
+        <p:txBody>
+          <a:bodyPr wrap="none" rtlCol="0">
+            <a:spAutoFit/>
+          </a:bodyPr>
+          <a:lstStyle/>
+          <a:p>
+            <a:r>
+              <a:rPr lang="fr-FR" dirty="0">
+                <a:solidFill>
+                  <a:schemeClr val="bg1"/>
+                </a:solidFill>
+                <a:latin typeface="Impact" panose="020B0806030902050204" pitchFamily="34" charset="0"/>
+              </a:rPr>
+              <a:t>FP</a:t>
+            </a:r>
+          </a:p>
+        </p:txBody>
+      </p:sp>
+      <p:sp>
+        <p:nvSpPr>
+          <p:cNvPr id="10" name="ZoneTexte 9">
+            <a:extLst>
+              <a:ext uri="{FF2B5EF4-FFF2-40B4-BE49-F238E27FC236}">
+                <a16:creationId xmlns:a16="http://schemas.microsoft.com/office/drawing/2014/main" id="{94C51D79-EF7C-AB50-23B8-8D20A261FECE}"/>
+              </a:ext>
+            </a:extLst>
+          </p:cNvPr>
+          <p:cNvSpPr txBox="1"/>
+          <p:nvPr/>
+        </p:nvSpPr>
+        <p:spPr>
+          <a:xfrm>
+            <a:off x="9429741" y="4327133"/>
+            <a:ext cx="401072" cy="369332"/>
+          </a:xfrm>
+          <a:prstGeom prst="rect">
+            <a:avLst/>
+          </a:prstGeom>
+          <a:noFill/>
+        </p:spPr>
+        <p:txBody>
+          <a:bodyPr wrap="none" rtlCol="0">
+            <a:spAutoFit/>
+          </a:bodyPr>
+          <a:lstStyle/>
+          <a:p>
+            <a:r>
+              <a:rPr lang="fr-FR" dirty="0">
+                <a:solidFill>
+                  <a:schemeClr val="bg1"/>
+                </a:solidFill>
+                <a:latin typeface="Impact" panose="020B0806030902050204" pitchFamily="34" charset="0"/>
+              </a:rPr>
+              <a:t>FN</a:t>
+            </a:r>
+          </a:p>
+        </p:txBody>
+      </p:sp>
+      <p:sp>
+        <p:nvSpPr>
+          <p:cNvPr id="11" name="Flèche : droite 10">
+            <a:extLst>
+              <a:ext uri="{FF2B5EF4-FFF2-40B4-BE49-F238E27FC236}">
+                <a16:creationId xmlns:a16="http://schemas.microsoft.com/office/drawing/2014/main" id="{34E0538E-23B4-71CE-3C2D-9817412EE88A}"/>
+              </a:ext>
+            </a:extLst>
+          </p:cNvPr>
+          <p:cNvSpPr/>
+          <p:nvPr/>
+        </p:nvSpPr>
+        <p:spPr>
+          <a:xfrm>
+            <a:off x="9071115" y="4945594"/>
+            <a:ext cx="2462709" cy="415126"/>
+          </a:xfrm>
+          <a:prstGeom prst="rightArrow">
+            <a:avLst/>
+          </a:prstGeom>
+          <a:ln>
+            <a:noFill/>
+          </a:ln>
+        </p:spPr>
+        <p:style>
+          <a:lnRef idx="2">
+            <a:schemeClr val="accent2">
+              <a:shade val="15000"/>
+            </a:schemeClr>
+          </a:lnRef>
+          <a:fillRef idx="1">
+            <a:schemeClr val="accent2"/>
+          </a:fillRef>
+          <a:effectRef idx="0">
+            <a:schemeClr val="accent2"/>
+          </a:effectRef>
+          <a:fontRef idx="minor">
+            <a:schemeClr val="lt1"/>
+          </a:fontRef>
+        </p:style>
+        <p:txBody>
+          <a:bodyPr rtlCol="0" anchor="ctr"/>
+          <a:lstStyle/>
+          <a:p>
             <a:pPr algn="ctr"/>
             <a:r>
-              <a:rPr lang="fr-FR" sz="1800" dirty="0" err="1">
-                <a:effectLst/>
+              <a:rPr lang="fr-FR" sz="1400" dirty="0" err="1"/>
+              <a:t>Recall</a:t>
+            </a:r>
+            <a:endParaRPr lang="fr-FR" sz="1400" dirty="0"/>
+          </a:p>
+        </p:txBody>
+      </p:sp>
+      <p:sp>
+        <p:nvSpPr>
+          <p:cNvPr id="12" name="Flèche : haut 11">
+            <a:extLst>
+              <a:ext uri="{FF2B5EF4-FFF2-40B4-BE49-F238E27FC236}">
+                <a16:creationId xmlns:a16="http://schemas.microsoft.com/office/drawing/2014/main" id="{2B2780A1-6B03-466D-6689-6AACCC9C683D}"/>
+              </a:ext>
+            </a:extLst>
+          </p:cNvPr>
+          <p:cNvSpPr/>
+          <p:nvPr/>
+        </p:nvSpPr>
+        <p:spPr>
+          <a:xfrm>
+            <a:off x="11651587" y="2445328"/>
+            <a:ext cx="448785" cy="2405186"/>
+          </a:xfrm>
+          <a:prstGeom prst="upArrow">
+            <a:avLst/>
+          </a:prstGeom>
+        </p:spPr>
+        <p:style>
+          <a:lnRef idx="2">
+            <a:schemeClr val="accent1">
+              <a:shade val="15000"/>
+            </a:schemeClr>
+          </a:lnRef>
+          <a:fillRef idx="1">
+            <a:schemeClr val="accent1"/>
+          </a:fillRef>
+          <a:effectRef idx="0">
+            <a:schemeClr val="accent1"/>
+          </a:effectRef>
+          <a:fontRef idx="minor">
+            <a:schemeClr val="lt1"/>
+          </a:fontRef>
+        </p:style>
+        <p:txBody>
+          <a:bodyPr vert="vert270" rtlCol="0" anchor="ctr"/>
+          <a:lstStyle/>
+          <a:p>
+            <a:pPr algn="ctr"/>
+            <a:r>
+              <a:rPr lang="fr-FR" sz="1400" dirty="0" err="1"/>
+              <a:t>Precision</a:t>
+            </a:r>
+            <a:endParaRPr lang="fr-FR" sz="1400" dirty="0"/>
+          </a:p>
+        </p:txBody>
+      </p:sp>
+      <p:sp>
+        <p:nvSpPr>
+          <p:cNvPr id="13" name="ZoneTexte 12">
+            <a:extLst>
+              <a:ext uri="{FF2B5EF4-FFF2-40B4-BE49-F238E27FC236}">
+                <a16:creationId xmlns:a16="http://schemas.microsoft.com/office/drawing/2014/main" id="{75A7DDCB-B46A-C143-0CBA-80767CE342F5}"/>
+              </a:ext>
+            </a:extLst>
+          </p:cNvPr>
+          <p:cNvSpPr txBox="1"/>
+          <p:nvPr/>
+        </p:nvSpPr>
+        <p:spPr>
+          <a:xfrm>
+            <a:off x="9439930" y="1926271"/>
+            <a:ext cx="1701107" cy="369332"/>
+          </a:xfrm>
+          <a:prstGeom prst="rect">
+            <a:avLst/>
+          </a:prstGeom>
+          <a:solidFill>
+            <a:schemeClr val="bg1"/>
+          </a:solidFill>
+        </p:spPr>
+        <p:txBody>
+          <a:bodyPr wrap="none" rtlCol="0">
+            <a:spAutoFit/>
+          </a:bodyPr>
+          <a:lstStyle/>
+          <a:p>
+            <a:r>
+              <a:rPr lang="fr-FR" dirty="0">
                 <a:latin typeface="Courier New" panose="02070309020205020404" pitchFamily="49" charset="0"/>
-              </a:rPr>
-              <a:t>Recall</a:t>
-            </a:r>
-            <a:r>
-              <a:rPr lang="fr-FR" sz="1800" dirty="0">
-                <a:effectLst/>
+                <a:cs typeface="Courier New" panose="02070309020205020404" pitchFamily="49" charset="0"/>
+              </a:rPr>
+              <a:t>Prédictions</a:t>
+            </a:r>
+          </a:p>
+        </p:txBody>
+      </p:sp>
+      <p:sp>
+        <p:nvSpPr>
+          <p:cNvPr id="14" name="ZoneTexte 13">
+            <a:extLst>
+              <a:ext uri="{FF2B5EF4-FFF2-40B4-BE49-F238E27FC236}">
+                <a16:creationId xmlns:a16="http://schemas.microsoft.com/office/drawing/2014/main" id="{9866827D-2133-07C8-A144-3F2EC112ED77}"/>
+              </a:ext>
+            </a:extLst>
+          </p:cNvPr>
+          <p:cNvSpPr txBox="1"/>
+          <p:nvPr/>
+        </p:nvSpPr>
+        <p:spPr>
+          <a:xfrm rot="16200000">
+            <a:off x="7774542" y="3414423"/>
+            <a:ext cx="1838965" cy="369332"/>
+          </a:xfrm>
+          <a:prstGeom prst="rect">
+            <a:avLst/>
+          </a:prstGeom>
+          <a:solidFill>
+            <a:schemeClr val="bg1"/>
+          </a:solidFill>
+        </p:spPr>
+        <p:txBody>
+          <a:bodyPr wrap="none" rtlCol="0">
+            <a:spAutoFit/>
+          </a:bodyPr>
+          <a:lstStyle/>
+          <a:p>
+            <a:r>
+              <a:rPr lang="fr-FR" dirty="0">
                 <a:latin typeface="Courier New" panose="02070309020205020404" pitchFamily="49" charset="0"/>
-              </a:rPr>
-              <a:t> </a:t>
-            </a:r>
-          </a:p>
-          <a:p>
-            <a:pPr algn="ctr"/>
-            <a:r>
-              <a:rPr lang="fr-FR" sz="1800" dirty="0">
-                <a:effectLst/>
-                <a:latin typeface="Courier New" panose="02070309020205020404" pitchFamily="49" charset="0"/>
-              </a:rPr>
-              <a:t>TP/(TP+FN)</a:t>
-            </a:r>
-            <a:endParaRPr lang="fr-FR" dirty="0"/>
+                <a:cs typeface="Courier New" panose="02070309020205020404" pitchFamily="49" charset="0"/>
+              </a:rPr>
+              <a:t>Observations</a:t>
+            </a:r>
           </a:p>
         </p:txBody>
       </p:sp>
@@ -32440,6 +33907,254 @@
   <p:clrMapOvr>
     <a:masterClrMapping/>
   </p:clrMapOvr>
+  <p:timing>
+    <p:tnLst>
+      <p:par>
+        <p:cTn id="1" dur="indefinite" restart="never" nodeType="tmRoot">
+          <p:childTnLst>
+            <p:seq concurrent="1" nextAc="seek">
+              <p:cTn id="2" dur="indefinite" nodeType="mainSeq">
+                <p:childTnLst>
+                  <p:par>
+                    <p:cTn id="3" fill="hold">
+                      <p:stCondLst>
+                        <p:cond delay="indefinite"/>
+                      </p:stCondLst>
+                      <p:childTnLst>
+                        <p:par>
+                          <p:cTn id="4" fill="hold">
+                            <p:stCondLst>
+                              <p:cond delay="0"/>
+                            </p:stCondLst>
+                            <p:childTnLst>
+                              <p:par>
+                                <p:cTn id="5" presetID="10" presetClass="entr" presetSubtype="0" fill="hold" grpId="0" nodeType="clickEffect">
+                                  <p:stCondLst>
+                                    <p:cond delay="0"/>
+                                  </p:stCondLst>
+                                  <p:childTnLst>
+                                    <p:set>
+                                      <p:cBhvr>
+                                        <p:cTn id="6" dur="1" fill="hold">
+                                          <p:stCondLst>
+                                            <p:cond delay="0"/>
+                                          </p:stCondLst>
+                                        </p:cTn>
+                                        <p:tgtEl>
+                                          <p:spTgt spid="14"/>
+                                        </p:tgtEl>
+                                        <p:attrNameLst>
+                                          <p:attrName>style.visibility</p:attrName>
+                                        </p:attrNameLst>
+                                      </p:cBhvr>
+                                      <p:to>
+                                        <p:strVal val="visible"/>
+                                      </p:to>
+                                    </p:set>
+                                    <p:animEffect transition="in" filter="fade">
+                                      <p:cBhvr>
+                                        <p:cTn id="7" dur="500"/>
+                                        <p:tgtEl>
+                                          <p:spTgt spid="14"/>
+                                        </p:tgtEl>
+                                      </p:cBhvr>
+                                    </p:animEffect>
+                                  </p:childTnLst>
+                                </p:cTn>
+                              </p:par>
+                            </p:childTnLst>
+                          </p:cTn>
+                        </p:par>
+                      </p:childTnLst>
+                    </p:cTn>
+                  </p:par>
+                  <p:par>
+                    <p:cTn id="8" fill="hold">
+                      <p:stCondLst>
+                        <p:cond delay="indefinite"/>
+                      </p:stCondLst>
+                      <p:childTnLst>
+                        <p:par>
+                          <p:cTn id="9" fill="hold">
+                            <p:stCondLst>
+                              <p:cond delay="0"/>
+                            </p:stCondLst>
+                            <p:childTnLst>
+                              <p:par>
+                                <p:cTn id="10" presetID="10" presetClass="entr" presetSubtype="0" fill="hold" grpId="0" nodeType="clickEffect">
+                                  <p:stCondLst>
+                                    <p:cond delay="0"/>
+                                  </p:stCondLst>
+                                  <p:childTnLst>
+                                    <p:set>
+                                      <p:cBhvr>
+                                        <p:cTn id="11" dur="1" fill="hold">
+                                          <p:stCondLst>
+                                            <p:cond delay="0"/>
+                                          </p:stCondLst>
+                                        </p:cTn>
+                                        <p:tgtEl>
+                                          <p:spTgt spid="13"/>
+                                        </p:tgtEl>
+                                        <p:attrNameLst>
+                                          <p:attrName>style.visibility</p:attrName>
+                                        </p:attrNameLst>
+                                      </p:cBhvr>
+                                      <p:to>
+                                        <p:strVal val="visible"/>
+                                      </p:to>
+                                    </p:set>
+                                    <p:animEffect transition="in" filter="fade">
+                                      <p:cBhvr>
+                                        <p:cTn id="12" dur="500"/>
+                                        <p:tgtEl>
+                                          <p:spTgt spid="13"/>
+                                        </p:tgtEl>
+                                      </p:cBhvr>
+                                    </p:animEffect>
+                                  </p:childTnLst>
+                                </p:cTn>
+                              </p:par>
+                            </p:childTnLst>
+                          </p:cTn>
+                        </p:par>
+                      </p:childTnLst>
+                    </p:cTn>
+                  </p:par>
+                  <p:par>
+                    <p:cTn id="13" fill="hold">
+                      <p:stCondLst>
+                        <p:cond delay="indefinite"/>
+                      </p:stCondLst>
+                      <p:childTnLst>
+                        <p:par>
+                          <p:cTn id="14" fill="hold">
+                            <p:stCondLst>
+                              <p:cond delay="0"/>
+                            </p:stCondLst>
+                            <p:childTnLst>
+                              <p:par>
+                                <p:cTn id="15" presetID="22" presetClass="entr" presetSubtype="4" fill="hold" grpId="0" nodeType="clickEffect">
+                                  <p:stCondLst>
+                                    <p:cond delay="0"/>
+                                  </p:stCondLst>
+                                  <p:childTnLst>
+                                    <p:set>
+                                      <p:cBhvr>
+                                        <p:cTn id="16" dur="1" fill="hold">
+                                          <p:stCondLst>
+                                            <p:cond delay="0"/>
+                                          </p:stCondLst>
+                                        </p:cTn>
+                                        <p:tgtEl>
+                                          <p:spTgt spid="12"/>
+                                        </p:tgtEl>
+                                        <p:attrNameLst>
+                                          <p:attrName>style.visibility</p:attrName>
+                                        </p:attrNameLst>
+                                      </p:cBhvr>
+                                      <p:to>
+                                        <p:strVal val="visible"/>
+                                      </p:to>
+                                    </p:set>
+                                    <p:animEffect transition="in" filter="wipe(down)">
+                                      <p:cBhvr>
+                                        <p:cTn id="17" dur="500"/>
+                                        <p:tgtEl>
+                                          <p:spTgt spid="12"/>
+                                        </p:tgtEl>
+                                      </p:cBhvr>
+                                    </p:animEffect>
+                                  </p:childTnLst>
+                                </p:cTn>
+                              </p:par>
+                            </p:childTnLst>
+                          </p:cTn>
+                        </p:par>
+                      </p:childTnLst>
+                    </p:cTn>
+                  </p:par>
+                  <p:par>
+                    <p:cTn id="18" fill="hold">
+                      <p:stCondLst>
+                        <p:cond delay="indefinite"/>
+                      </p:stCondLst>
+                      <p:childTnLst>
+                        <p:par>
+                          <p:cTn id="19" fill="hold">
+                            <p:stCondLst>
+                              <p:cond delay="0"/>
+                            </p:stCondLst>
+                            <p:childTnLst>
+                              <p:par>
+                                <p:cTn id="20" presetID="22" presetClass="entr" presetSubtype="8" fill="hold" grpId="0" nodeType="clickEffect">
+                                  <p:stCondLst>
+                                    <p:cond delay="0"/>
+                                  </p:stCondLst>
+                                  <p:childTnLst>
+                                    <p:set>
+                                      <p:cBhvr>
+                                        <p:cTn id="21" dur="1" fill="hold">
+                                          <p:stCondLst>
+                                            <p:cond delay="0"/>
+                                          </p:stCondLst>
+                                        </p:cTn>
+                                        <p:tgtEl>
+                                          <p:spTgt spid="11"/>
+                                        </p:tgtEl>
+                                        <p:attrNameLst>
+                                          <p:attrName>style.visibility</p:attrName>
+                                        </p:attrNameLst>
+                                      </p:cBhvr>
+                                      <p:to>
+                                        <p:strVal val="visible"/>
+                                      </p:to>
+                                    </p:set>
+                                    <p:animEffect transition="in" filter="wipe(left)">
+                                      <p:cBhvr>
+                                        <p:cTn id="22" dur="500"/>
+                                        <p:tgtEl>
+                                          <p:spTgt spid="11"/>
+                                        </p:tgtEl>
+                                      </p:cBhvr>
+                                    </p:animEffect>
+                                  </p:childTnLst>
+                                </p:cTn>
+                              </p:par>
+                            </p:childTnLst>
+                          </p:cTn>
+                        </p:par>
+                      </p:childTnLst>
+                    </p:cTn>
+                  </p:par>
+                </p:childTnLst>
+              </p:cTn>
+              <p:prevCondLst>
+                <p:cond evt="onPrev" delay="0">
+                  <p:tgtEl>
+                    <p:sldTgt/>
+                  </p:tgtEl>
+                </p:cond>
+              </p:prevCondLst>
+              <p:nextCondLst>
+                <p:cond evt="onNext" delay="0">
+                  <p:tgtEl>
+                    <p:sldTgt/>
+                  </p:tgtEl>
+                </p:cond>
+              </p:nextCondLst>
+            </p:seq>
+          </p:childTnLst>
+        </p:cTn>
+      </p:par>
+    </p:tnLst>
+    <p:bldLst>
+      <p:bldP spid="11" grpId="0" animBg="1"/>
+      <p:bldP spid="12" grpId="0" animBg="1"/>
+      <p:bldP spid="13" grpId="0" animBg="1"/>
+      <p:bldP spid="14" grpId="0" animBg="1"/>
+    </p:bldLst>
+  </p:timing>
 </p:sld>
 </file>
 

</xml_diff>